<commit_message>
Added lernOS Wheel Men v02, Updated Canvas
</commit_message>
<xml_diff>
--- a/lernOS Canvas/lernOS-Canvas.pptx
+++ b/lernOS Canvas/lernOS-Canvas.pptx
@@ -560,7 +560,7 @@
           <a:p>
             <a:fld id="{20C92C68-3061-4D10-8505-88D0E29B3BEE}" type="datetimeFigureOut">
               <a:rPr lang="de-DE" smtClean="0"/>
-              <a:t>30.06.2018</a:t>
+              <a:t>26.07.2018</a:t>
             </a:fld>
             <a:endParaRPr lang="de-DE"/>
           </a:p>
@@ -730,7 +730,7 @@
           <a:p>
             <a:fld id="{20C92C68-3061-4D10-8505-88D0E29B3BEE}" type="datetimeFigureOut">
               <a:rPr lang="de-DE" smtClean="0"/>
-              <a:t>30.06.2018</a:t>
+              <a:t>26.07.2018</a:t>
             </a:fld>
             <a:endParaRPr lang="de-DE"/>
           </a:p>
@@ -910,7 +910,7 @@
           <a:p>
             <a:fld id="{20C92C68-3061-4D10-8505-88D0E29B3BEE}" type="datetimeFigureOut">
               <a:rPr lang="de-DE" smtClean="0"/>
-              <a:t>30.06.2018</a:t>
+              <a:t>26.07.2018</a:t>
             </a:fld>
             <a:endParaRPr lang="de-DE"/>
           </a:p>
@@ -1080,7 +1080,7 @@
           <a:p>
             <a:fld id="{20C92C68-3061-4D10-8505-88D0E29B3BEE}" type="datetimeFigureOut">
               <a:rPr lang="de-DE" smtClean="0"/>
-              <a:t>30.06.2018</a:t>
+              <a:t>26.07.2018</a:t>
             </a:fld>
             <a:endParaRPr lang="de-DE"/>
           </a:p>
@@ -1324,7 +1324,7 @@
           <a:p>
             <a:fld id="{20C92C68-3061-4D10-8505-88D0E29B3BEE}" type="datetimeFigureOut">
               <a:rPr lang="de-DE" smtClean="0"/>
-              <a:t>30.06.2018</a:t>
+              <a:t>26.07.2018</a:t>
             </a:fld>
             <a:endParaRPr lang="de-DE"/>
           </a:p>
@@ -1556,7 +1556,7 @@
           <a:p>
             <a:fld id="{20C92C68-3061-4D10-8505-88D0E29B3BEE}" type="datetimeFigureOut">
               <a:rPr lang="de-DE" smtClean="0"/>
-              <a:t>30.06.2018</a:t>
+              <a:t>26.07.2018</a:t>
             </a:fld>
             <a:endParaRPr lang="de-DE"/>
           </a:p>
@@ -1923,7 +1923,7 @@
           <a:p>
             <a:fld id="{20C92C68-3061-4D10-8505-88D0E29B3BEE}" type="datetimeFigureOut">
               <a:rPr lang="de-DE" smtClean="0"/>
-              <a:t>30.06.2018</a:t>
+              <a:t>26.07.2018</a:t>
             </a:fld>
             <a:endParaRPr lang="de-DE"/>
           </a:p>
@@ -2041,7 +2041,7 @@
           <a:p>
             <a:fld id="{20C92C68-3061-4D10-8505-88D0E29B3BEE}" type="datetimeFigureOut">
               <a:rPr lang="de-DE" smtClean="0"/>
-              <a:t>30.06.2018</a:t>
+              <a:t>26.07.2018</a:t>
             </a:fld>
             <a:endParaRPr lang="de-DE"/>
           </a:p>
@@ -2136,7 +2136,7 @@
           <a:p>
             <a:fld id="{20C92C68-3061-4D10-8505-88D0E29B3BEE}" type="datetimeFigureOut">
               <a:rPr lang="de-DE" smtClean="0"/>
-              <a:t>30.06.2018</a:t>
+              <a:t>26.07.2018</a:t>
             </a:fld>
             <a:endParaRPr lang="de-DE"/>
           </a:p>
@@ -2413,7 +2413,7 @@
           <a:p>
             <a:fld id="{20C92C68-3061-4D10-8505-88D0E29B3BEE}" type="datetimeFigureOut">
               <a:rPr lang="de-DE" smtClean="0"/>
-              <a:t>30.06.2018</a:t>
+              <a:t>26.07.2018</a:t>
             </a:fld>
             <a:endParaRPr lang="de-DE"/>
           </a:p>
@@ -2670,7 +2670,7 @@
           <a:p>
             <a:fld id="{20C92C68-3061-4D10-8505-88D0E29B3BEE}" type="datetimeFigureOut">
               <a:rPr lang="de-DE" smtClean="0"/>
-              <a:t>30.06.2018</a:t>
+              <a:t>26.07.2018</a:t>
             </a:fld>
             <a:endParaRPr lang="de-DE"/>
           </a:p>
@@ -2883,7 +2883,7 @@
           <a:p>
             <a:fld id="{20C92C68-3061-4D10-8505-88D0E29B3BEE}" type="datetimeFigureOut">
               <a:rPr lang="de-DE" smtClean="0"/>
-              <a:t>30.06.2018</a:t>
+              <a:t>26.07.2018</a:t>
             </a:fld>
             <a:endParaRPr lang="de-DE"/>
           </a:p>
@@ -3415,7 +3415,7 @@
         <p:spPr>
           <a:xfrm>
             <a:off x="657375" y="755049"/>
-            <a:ext cx="1045479" cy="584775"/>
+            <a:ext cx="1186543" cy="584775"/>
           </a:xfrm>
           <a:prstGeom prst="rect">
             <a:avLst/>
@@ -3468,6 +3468,12 @@
           <a:p>
             <a:r>
               <a:rPr lang="de-DE" sz="600" dirty="0" err="1">
+                <a:solidFill>
+                  <a:schemeClr val="tx1">
+                    <a:lumMod val="50000"/>
+                    <a:lumOff val="50000"/>
+                  </a:schemeClr>
+                </a:solidFill>
                 <a:ea typeface="Open Sans Semibold" panose="020B0706030804020204" pitchFamily="34" charset="0"/>
                 <a:cs typeface="Open Sans Semibold" panose="020B0706030804020204" pitchFamily="34" charset="0"/>
               </a:rPr>
@@ -3475,6 +3481,12 @@
             </a:r>
             <a:r>
               <a:rPr lang="de-DE" sz="600" dirty="0">
+                <a:solidFill>
+                  <a:schemeClr val="tx1">
+                    <a:lumMod val="50000"/>
+                    <a:lumOff val="50000"/>
+                  </a:schemeClr>
+                </a:solidFill>
                 <a:ea typeface="Open Sans Semibold" panose="020B0706030804020204" pitchFamily="34" charset="0"/>
                 <a:cs typeface="Open Sans Semibold" panose="020B0706030804020204" pitchFamily="34" charset="0"/>
               </a:rPr>
@@ -3482,6 +3494,12 @@
             </a:r>
             <a:r>
               <a:rPr lang="de-DE" sz="600" dirty="0" err="1">
+                <a:solidFill>
+                  <a:schemeClr val="tx1">
+                    <a:lumMod val="50000"/>
+                    <a:lumOff val="50000"/>
+                  </a:schemeClr>
+                </a:solidFill>
                 <a:ea typeface="Open Sans Semibold" panose="020B0706030804020204" pitchFamily="34" charset="0"/>
                 <a:cs typeface="Open Sans Semibold" panose="020B0706030804020204" pitchFamily="34" charset="0"/>
               </a:rPr>
@@ -3489,6 +3507,12 @@
             </a:r>
             <a:r>
               <a:rPr lang="de-DE" sz="600" dirty="0">
+                <a:solidFill>
+                  <a:schemeClr val="tx1">
+                    <a:lumMod val="50000"/>
+                    <a:lumOff val="50000"/>
+                  </a:schemeClr>
+                </a:solidFill>
                 <a:ea typeface="Open Sans Semibold" panose="020B0706030804020204" pitchFamily="34" charset="0"/>
                 <a:cs typeface="Open Sans Semibold" panose="020B0706030804020204" pitchFamily="34" charset="0"/>
               </a:rPr>
@@ -3496,6 +3520,12 @@
             </a:r>
             <a:r>
               <a:rPr lang="de-DE" sz="600" dirty="0" err="1">
+                <a:solidFill>
+                  <a:schemeClr val="tx1">
+                    <a:lumMod val="50000"/>
+                    <a:lumOff val="50000"/>
+                  </a:schemeClr>
+                </a:solidFill>
                 <a:ea typeface="Open Sans Semibold" panose="020B0706030804020204" pitchFamily="34" charset="0"/>
                 <a:cs typeface="Open Sans Semibold" panose="020B0706030804020204" pitchFamily="34" charset="0"/>
               </a:rPr>
@@ -3503,6 +3533,12 @@
             </a:r>
             <a:r>
               <a:rPr lang="de-DE" sz="600" dirty="0">
+                <a:solidFill>
+                  <a:schemeClr val="tx1">
+                    <a:lumMod val="50000"/>
+                    <a:lumOff val="50000"/>
+                  </a:schemeClr>
+                </a:solidFill>
                 <a:ea typeface="Open Sans Semibold" panose="020B0706030804020204" pitchFamily="34" charset="0"/>
                 <a:cs typeface="Open Sans Semibold" panose="020B0706030804020204" pitchFamily="34" charset="0"/>
               </a:rPr>
@@ -3510,6 +3546,12 @@
             </a:r>
             <a:r>
               <a:rPr lang="de-DE" sz="600" dirty="0" err="1">
+                <a:solidFill>
+                  <a:schemeClr val="tx1">
+                    <a:lumMod val="50000"/>
+                    <a:lumOff val="50000"/>
+                  </a:schemeClr>
+                </a:solidFill>
                 <a:ea typeface="Open Sans Semibold" panose="020B0706030804020204" pitchFamily="34" charset="0"/>
                 <a:cs typeface="Open Sans Semibold" panose="020B0706030804020204" pitchFamily="34" charset="0"/>
               </a:rPr>
@@ -3517,6 +3559,12 @@
             </a:r>
             <a:r>
               <a:rPr lang="de-DE" sz="600" dirty="0">
+                <a:solidFill>
+                  <a:schemeClr val="tx1">
+                    <a:lumMod val="50000"/>
+                    <a:lumOff val="50000"/>
+                  </a:schemeClr>
+                </a:solidFill>
                 <a:ea typeface="Open Sans Semibold" panose="020B0706030804020204" pitchFamily="34" charset="0"/>
                 <a:cs typeface="Open Sans Semibold" panose="020B0706030804020204" pitchFamily="34" charset="0"/>
               </a:rPr>
@@ -3524,6 +3572,12 @@
             </a:r>
             <a:r>
               <a:rPr lang="de-DE" sz="600" dirty="0" err="1">
+                <a:solidFill>
+                  <a:schemeClr val="tx1">
+                    <a:lumMod val="50000"/>
+                    <a:lumOff val="50000"/>
+                  </a:schemeClr>
+                </a:solidFill>
                 <a:ea typeface="Open Sans Semibold" panose="020B0706030804020204" pitchFamily="34" charset="0"/>
                 <a:cs typeface="Open Sans Semibold" panose="020B0706030804020204" pitchFamily="34" charset="0"/>
               </a:rPr>
@@ -3531,15 +3585,37 @@
             </a:r>
             <a:r>
               <a:rPr lang="de-DE" sz="600" dirty="0">
+                <a:solidFill>
+                  <a:schemeClr val="tx1">
+                    <a:lumMod val="50000"/>
+                    <a:lumOff val="50000"/>
+                  </a:schemeClr>
+                </a:solidFill>
                 <a:ea typeface="Open Sans Semibold" panose="020B0706030804020204" pitchFamily="34" charset="0"/>
                 <a:cs typeface="Open Sans Semibold" panose="020B0706030804020204" pitchFamily="34" charset="0"/>
               </a:rPr>
               <a:t>?</a:t>
             </a:r>
-          </a:p>
-          <a:p>
-            <a:r>
-              <a:rPr lang="de-DE" sz="600" dirty="0" err="1">
+            <a:br>
+              <a:rPr lang="de-DE" sz="600" dirty="0">
+                <a:solidFill>
+                  <a:schemeClr val="tx1">
+                    <a:lumMod val="50000"/>
+                    <a:lumOff val="50000"/>
+                  </a:schemeClr>
+                </a:solidFill>
+                <a:ea typeface="Open Sans Semibold" panose="020B0706030804020204" pitchFamily="34" charset="0"/>
+                <a:cs typeface="Open Sans Semibold" panose="020B0706030804020204" pitchFamily="34" charset="0"/>
+              </a:rPr>
+            </a:br>
+            <a:r>
+              <a:rPr lang="de-DE" sz="600" dirty="0" err="1">
+                <a:solidFill>
+                  <a:schemeClr val="tx1">
+                    <a:lumMod val="50000"/>
+                    <a:lumOff val="50000"/>
+                  </a:schemeClr>
+                </a:solidFill>
                 <a:ea typeface="Open Sans Semibold" panose="020B0706030804020204" pitchFamily="34" charset="0"/>
                 <a:cs typeface="Open Sans Semibold" panose="020B0706030804020204" pitchFamily="34" charset="0"/>
               </a:rPr>
@@ -3547,20 +3623,12 @@
             </a:r>
             <a:r>
               <a:rPr lang="de-DE" sz="600" dirty="0">
-                <a:ea typeface="Open Sans Semibold" panose="020B0706030804020204" pitchFamily="34" charset="0"/>
-                <a:cs typeface="Open Sans Semibold" panose="020B0706030804020204" pitchFamily="34" charset="0"/>
-              </a:rPr>
-              <a:t> am I </a:t>
-            </a:r>
-            <a:r>
-              <a:rPr lang="de-DE" sz="600" dirty="0" err="1">
-                <a:ea typeface="Open Sans Semibold" panose="020B0706030804020204" pitchFamily="34" charset="0"/>
-                <a:cs typeface="Open Sans Semibold" panose="020B0706030804020204" pitchFamily="34" charset="0"/>
-              </a:rPr>
-              <a:t>responsible</a:t>
-            </a:r>
-            <a:r>
-              <a:rPr lang="de-DE" sz="600" dirty="0">
+                <a:solidFill>
+                  <a:schemeClr val="tx1">
+                    <a:lumMod val="50000"/>
+                    <a:lumOff val="50000"/>
+                  </a:schemeClr>
+                </a:solidFill>
                 <a:ea typeface="Open Sans Semibold" panose="020B0706030804020204" pitchFamily="34" charset="0"/>
                 <a:cs typeface="Open Sans Semibold" panose="020B0706030804020204" pitchFamily="34" charset="0"/>
               </a:rPr>
@@ -3568,23 +3636,108 @@
             </a:r>
             <a:r>
               <a:rPr lang="de-DE" sz="600" dirty="0" err="1">
-                <a:ea typeface="Open Sans Semibold" panose="020B0706030804020204" pitchFamily="34" charset="0"/>
-                <a:cs typeface="Open Sans Semibold" panose="020B0706030804020204" pitchFamily="34" charset="0"/>
-              </a:rPr>
-              <a:t>for</a:t>
-            </a:r>
-            <a:r>
-              <a:rPr lang="de-DE" sz="600" dirty="0">
+                <a:solidFill>
+                  <a:schemeClr val="tx1">
+                    <a:lumMod val="50000"/>
+                    <a:lumOff val="50000"/>
+                  </a:schemeClr>
+                </a:solidFill>
+                <a:ea typeface="Open Sans Semibold" panose="020B0706030804020204" pitchFamily="34" charset="0"/>
+                <a:cs typeface="Open Sans Semibold" panose="020B0706030804020204" pitchFamily="34" charset="0"/>
+              </a:rPr>
+              <a:t>objectives</a:t>
+            </a:r>
+            <a:r>
+              <a:rPr lang="de-DE" sz="600" dirty="0">
+                <a:solidFill>
+                  <a:schemeClr val="tx1">
+                    <a:lumMod val="50000"/>
+                    <a:lumOff val="50000"/>
+                  </a:schemeClr>
+                </a:solidFill>
+                <a:ea typeface="Open Sans Semibold" panose="020B0706030804020204" pitchFamily="34" charset="0"/>
+                <a:cs typeface="Open Sans Semibold" panose="020B0706030804020204" pitchFamily="34" charset="0"/>
+              </a:rPr>
+              <a:t> </a:t>
+            </a:r>
+            <a:r>
+              <a:rPr lang="de-DE" sz="600" dirty="0" err="1">
+                <a:solidFill>
+                  <a:schemeClr val="tx1">
+                    <a:lumMod val="50000"/>
+                    <a:lumOff val="50000"/>
+                  </a:schemeClr>
+                </a:solidFill>
+                <a:ea typeface="Open Sans Semibold" panose="020B0706030804020204" pitchFamily="34" charset="0"/>
+                <a:cs typeface="Open Sans Semibold" panose="020B0706030804020204" pitchFamily="34" charset="0"/>
+              </a:rPr>
+              <a:t>arise</a:t>
+            </a:r>
+            <a:r>
+              <a:rPr lang="de-DE" sz="600" dirty="0">
+                <a:solidFill>
+                  <a:schemeClr val="tx1">
+                    <a:lumMod val="50000"/>
+                    <a:lumOff val="50000"/>
+                  </a:schemeClr>
+                </a:solidFill>
+                <a:ea typeface="Open Sans Semibold" panose="020B0706030804020204" pitchFamily="34" charset="0"/>
+                <a:cs typeface="Open Sans Semibold" panose="020B0706030804020204" pitchFamily="34" charset="0"/>
+              </a:rPr>
+              <a:t> </a:t>
+            </a:r>
+            <a:r>
+              <a:rPr lang="de-DE" sz="600" dirty="0" err="1">
+                <a:solidFill>
+                  <a:schemeClr val="tx1">
+                    <a:lumMod val="50000"/>
+                    <a:lumOff val="50000"/>
+                  </a:schemeClr>
+                </a:solidFill>
+                <a:ea typeface="Open Sans Semibold" panose="020B0706030804020204" pitchFamily="34" charset="0"/>
+                <a:cs typeface="Open Sans Semibold" panose="020B0706030804020204" pitchFamily="34" charset="0"/>
+              </a:rPr>
+              <a:t>the</a:t>
+            </a:r>
+            <a:r>
+              <a:rPr lang="de-DE" sz="600" dirty="0">
+                <a:solidFill>
+                  <a:schemeClr val="tx1">
+                    <a:lumMod val="50000"/>
+                    <a:lumOff val="50000"/>
+                  </a:schemeClr>
+                </a:solidFill>
+                <a:ea typeface="Open Sans Semibold" panose="020B0706030804020204" pitchFamily="34" charset="0"/>
+                <a:cs typeface="Open Sans Semibold" panose="020B0706030804020204" pitchFamily="34" charset="0"/>
+              </a:rPr>
+              <a:t> </a:t>
+            </a:r>
+            <a:r>
+              <a:rPr lang="de-DE" sz="600" dirty="0" err="1">
+                <a:solidFill>
+                  <a:schemeClr val="tx1">
+                    <a:lumMod val="50000"/>
+                    <a:lumOff val="50000"/>
+                  </a:schemeClr>
+                </a:solidFill>
+                <a:ea typeface="Open Sans Semibold" panose="020B0706030804020204" pitchFamily="34" charset="0"/>
+                <a:cs typeface="Open Sans Semibold" panose="020B0706030804020204" pitchFamily="34" charset="0"/>
+              </a:rPr>
+              <a:t>roles</a:t>
+            </a:r>
+            <a:r>
+              <a:rPr lang="de-DE" sz="600" dirty="0">
+                <a:solidFill>
+                  <a:schemeClr val="tx1">
+                    <a:lumMod val="50000"/>
+                    <a:lumOff val="50000"/>
+                  </a:schemeClr>
+                </a:solidFill>
                 <a:ea typeface="Open Sans Semibold" panose="020B0706030804020204" pitchFamily="34" charset="0"/>
                 <a:cs typeface="Open Sans Semibold" panose="020B0706030804020204" pitchFamily="34" charset="0"/>
               </a:rPr>
               <a:t>?</a:t>
             </a:r>
-            <a:endParaRPr lang="de-DE" sz="1100" dirty="0">
-              <a:latin typeface="Bodoni MT" panose="02070603080606020203" pitchFamily="18" charset="0"/>
-              <a:ea typeface="Open Sans Semibold" panose="020B0706030804020204" pitchFamily="34" charset="0"/>
-              <a:cs typeface="Open Sans Semibold" panose="020B0706030804020204" pitchFamily="34" charset="0"/>
-            </a:endParaRPr>
           </a:p>
         </p:txBody>
       </p:sp>
@@ -3603,7 +3756,7 @@
         <p:spPr>
           <a:xfrm>
             <a:off x="2381142" y="768769"/>
-            <a:ext cx="1050288" cy="492443"/>
+            <a:ext cx="1191352" cy="584775"/>
           </a:xfrm>
           <a:prstGeom prst="rect">
             <a:avLst/>
@@ -3744,6 +3897,148 @@
                 <a:cs typeface="Open Sans Semibold" panose="020B0706030804020204" pitchFamily="34" charset="0"/>
               </a:rPr>
               <a:t>current</a:t>
+            </a:r>
+            <a:r>
+              <a:rPr lang="de-DE" sz="600" dirty="0">
+                <a:solidFill>
+                  <a:schemeClr val="tx1">
+                    <a:lumMod val="50000"/>
+                    <a:lumOff val="50000"/>
+                  </a:schemeClr>
+                </a:solidFill>
+                <a:ea typeface="Open Sans Semibold" panose="020B0706030804020204" pitchFamily="34" charset="0"/>
+                <a:cs typeface="Open Sans Semibold" panose="020B0706030804020204" pitchFamily="34" charset="0"/>
+              </a:rPr>
+              <a:t> </a:t>
+            </a:r>
+            <a:r>
+              <a:rPr lang="de-DE" sz="600" dirty="0" err="1">
+                <a:solidFill>
+                  <a:schemeClr val="tx1">
+                    <a:lumMod val="50000"/>
+                    <a:lumOff val="50000"/>
+                  </a:schemeClr>
+                </a:solidFill>
+                <a:ea typeface="Open Sans Semibold" panose="020B0706030804020204" pitchFamily="34" charset="0"/>
+                <a:cs typeface="Open Sans Semibold" panose="020B0706030804020204" pitchFamily="34" charset="0"/>
+              </a:rPr>
+              <a:t>tasks</a:t>
+            </a:r>
+            <a:r>
+              <a:rPr lang="de-DE" sz="600" dirty="0">
+                <a:solidFill>
+                  <a:schemeClr val="tx1">
+                    <a:lumMod val="50000"/>
+                    <a:lumOff val="50000"/>
+                  </a:schemeClr>
+                </a:solidFill>
+                <a:ea typeface="Open Sans Semibold" panose="020B0706030804020204" pitchFamily="34" charset="0"/>
+                <a:cs typeface="Open Sans Semibold" panose="020B0706030804020204" pitchFamily="34" charset="0"/>
+              </a:rPr>
+              <a:t>?</a:t>
+            </a:r>
+            <a:br>
+              <a:rPr lang="de-DE" sz="600" dirty="0">
+                <a:solidFill>
+                  <a:schemeClr val="tx1">
+                    <a:lumMod val="50000"/>
+                    <a:lumOff val="50000"/>
+                  </a:schemeClr>
+                </a:solidFill>
+                <a:ea typeface="Open Sans Semibold" panose="020B0706030804020204" pitchFamily="34" charset="0"/>
+                <a:cs typeface="Open Sans Semibold" panose="020B0706030804020204" pitchFamily="34" charset="0"/>
+              </a:rPr>
+            </a:br>
+            <a:r>
+              <a:rPr lang="de-DE" sz="600" dirty="0" err="1">
+                <a:solidFill>
+                  <a:schemeClr val="tx1">
+                    <a:lumMod val="50000"/>
+                    <a:lumOff val="50000"/>
+                  </a:schemeClr>
+                </a:solidFill>
+                <a:ea typeface="Open Sans Semibold" panose="020B0706030804020204" pitchFamily="34" charset="0"/>
+                <a:cs typeface="Open Sans Semibold" panose="020B0706030804020204" pitchFamily="34" charset="0"/>
+              </a:rPr>
+              <a:t>What</a:t>
+            </a:r>
+            <a:r>
+              <a:rPr lang="de-DE" sz="600" dirty="0">
+                <a:solidFill>
+                  <a:schemeClr val="tx1">
+                    <a:lumMod val="50000"/>
+                    <a:lumOff val="50000"/>
+                  </a:schemeClr>
+                </a:solidFill>
+                <a:ea typeface="Open Sans Semibold" panose="020B0706030804020204" pitchFamily="34" charset="0"/>
+                <a:cs typeface="Open Sans Semibold" panose="020B0706030804020204" pitchFamily="34" charset="0"/>
+              </a:rPr>
+              <a:t> </a:t>
+            </a:r>
+            <a:r>
+              <a:rPr lang="de-DE" sz="600" dirty="0" err="1">
+                <a:solidFill>
+                  <a:schemeClr val="tx1">
+                    <a:lumMod val="50000"/>
+                    <a:lumOff val="50000"/>
+                  </a:schemeClr>
+                </a:solidFill>
+                <a:ea typeface="Open Sans Semibold" panose="020B0706030804020204" pitchFamily="34" charset="0"/>
+                <a:cs typeface="Open Sans Semibold" panose="020B0706030804020204" pitchFamily="34" charset="0"/>
+              </a:rPr>
+              <a:t>objectives</a:t>
+            </a:r>
+            <a:r>
+              <a:rPr lang="de-DE" sz="600" dirty="0">
+                <a:solidFill>
+                  <a:schemeClr val="tx1">
+                    <a:lumMod val="50000"/>
+                    <a:lumOff val="50000"/>
+                  </a:schemeClr>
+                </a:solidFill>
+                <a:ea typeface="Open Sans Semibold" panose="020B0706030804020204" pitchFamily="34" charset="0"/>
+                <a:cs typeface="Open Sans Semibold" panose="020B0706030804020204" pitchFamily="34" charset="0"/>
+              </a:rPr>
+              <a:t> </a:t>
+            </a:r>
+            <a:r>
+              <a:rPr lang="de-DE" sz="600" dirty="0" err="1">
+                <a:solidFill>
+                  <a:schemeClr val="tx1">
+                    <a:lumMod val="50000"/>
+                    <a:lumOff val="50000"/>
+                  </a:schemeClr>
+                </a:solidFill>
+                <a:ea typeface="Open Sans Semibold" panose="020B0706030804020204" pitchFamily="34" charset="0"/>
+                <a:cs typeface="Open Sans Semibold" panose="020B0706030804020204" pitchFamily="34" charset="0"/>
+              </a:rPr>
+              <a:t>arise</a:t>
+            </a:r>
+            <a:r>
+              <a:rPr lang="de-DE" sz="600" dirty="0">
+                <a:solidFill>
+                  <a:schemeClr val="tx1">
+                    <a:lumMod val="50000"/>
+                    <a:lumOff val="50000"/>
+                  </a:schemeClr>
+                </a:solidFill>
+                <a:ea typeface="Open Sans Semibold" panose="020B0706030804020204" pitchFamily="34" charset="0"/>
+                <a:cs typeface="Open Sans Semibold" panose="020B0706030804020204" pitchFamily="34" charset="0"/>
+              </a:rPr>
+              <a:t> </a:t>
+            </a:r>
+            <a:r>
+              <a:rPr lang="de-DE" sz="600" dirty="0" err="1">
+                <a:solidFill>
+                  <a:schemeClr val="tx1">
+                    <a:lumMod val="50000"/>
+                    <a:lumOff val="50000"/>
+                  </a:schemeClr>
+                </a:solidFill>
+                <a:ea typeface="Open Sans Semibold" panose="020B0706030804020204" pitchFamily="34" charset="0"/>
+                <a:cs typeface="Open Sans Semibold" panose="020B0706030804020204" pitchFamily="34" charset="0"/>
+              </a:rPr>
+              <a:t>the</a:t>
             </a:r>
             <a:r>
               <a:rPr lang="de-DE" sz="600" dirty="0">
@@ -3812,7 +4107,7 @@
         <p:spPr>
           <a:xfrm>
             <a:off x="2377413" y="2819398"/>
-            <a:ext cx="1143262" cy="492443"/>
+            <a:ext cx="1284326" cy="584775"/>
           </a:xfrm>
           <a:prstGeom prst="rect">
             <a:avLst/>
@@ -3940,6 +4235,148 @@
                 <a:cs typeface="Open Sans Semibold" panose="020B0706030804020204" pitchFamily="34" charset="0"/>
               </a:rPr>
               <a:t>current</a:t>
+            </a:r>
+            <a:r>
+              <a:rPr lang="de-DE" sz="600" dirty="0">
+                <a:solidFill>
+                  <a:schemeClr val="tx1">
+                    <a:lumMod val="50000"/>
+                    <a:lumOff val="50000"/>
+                  </a:schemeClr>
+                </a:solidFill>
+                <a:ea typeface="Open Sans Semibold" panose="020B0706030804020204" pitchFamily="34" charset="0"/>
+                <a:cs typeface="Open Sans Semibold" panose="020B0706030804020204" pitchFamily="34" charset="0"/>
+              </a:rPr>
+              <a:t> </a:t>
+            </a:r>
+            <a:r>
+              <a:rPr lang="de-DE" sz="600" dirty="0" err="1">
+                <a:solidFill>
+                  <a:schemeClr val="tx1">
+                    <a:lumMod val="50000"/>
+                    <a:lumOff val="50000"/>
+                  </a:schemeClr>
+                </a:solidFill>
+                <a:ea typeface="Open Sans Semibold" panose="020B0706030804020204" pitchFamily="34" charset="0"/>
+                <a:cs typeface="Open Sans Semibold" panose="020B0706030804020204" pitchFamily="34" charset="0"/>
+              </a:rPr>
+              <a:t>projects</a:t>
+            </a:r>
+            <a:r>
+              <a:rPr lang="de-DE" sz="600" dirty="0">
+                <a:solidFill>
+                  <a:schemeClr val="tx1">
+                    <a:lumMod val="50000"/>
+                    <a:lumOff val="50000"/>
+                  </a:schemeClr>
+                </a:solidFill>
+                <a:ea typeface="Open Sans Semibold" panose="020B0706030804020204" pitchFamily="34" charset="0"/>
+                <a:cs typeface="Open Sans Semibold" panose="020B0706030804020204" pitchFamily="34" charset="0"/>
+              </a:rPr>
+              <a:t>?</a:t>
+            </a:r>
+            <a:br>
+              <a:rPr lang="de-DE" sz="600" dirty="0">
+                <a:solidFill>
+                  <a:schemeClr val="tx1">
+                    <a:lumMod val="50000"/>
+                    <a:lumOff val="50000"/>
+                  </a:schemeClr>
+                </a:solidFill>
+                <a:ea typeface="Open Sans Semibold" panose="020B0706030804020204" pitchFamily="34" charset="0"/>
+                <a:cs typeface="Open Sans Semibold" panose="020B0706030804020204" pitchFamily="34" charset="0"/>
+              </a:rPr>
+            </a:br>
+            <a:r>
+              <a:rPr lang="de-DE" sz="600" dirty="0" err="1">
+                <a:solidFill>
+                  <a:schemeClr val="tx1">
+                    <a:lumMod val="50000"/>
+                    <a:lumOff val="50000"/>
+                  </a:schemeClr>
+                </a:solidFill>
+                <a:ea typeface="Open Sans Semibold" panose="020B0706030804020204" pitchFamily="34" charset="0"/>
+                <a:cs typeface="Open Sans Semibold" panose="020B0706030804020204" pitchFamily="34" charset="0"/>
+              </a:rPr>
+              <a:t>What</a:t>
+            </a:r>
+            <a:r>
+              <a:rPr lang="de-DE" sz="600" dirty="0">
+                <a:solidFill>
+                  <a:schemeClr val="tx1">
+                    <a:lumMod val="50000"/>
+                    <a:lumOff val="50000"/>
+                  </a:schemeClr>
+                </a:solidFill>
+                <a:ea typeface="Open Sans Semibold" panose="020B0706030804020204" pitchFamily="34" charset="0"/>
+                <a:cs typeface="Open Sans Semibold" panose="020B0706030804020204" pitchFamily="34" charset="0"/>
+              </a:rPr>
+              <a:t> </a:t>
+            </a:r>
+            <a:r>
+              <a:rPr lang="de-DE" sz="600" dirty="0" err="1">
+                <a:solidFill>
+                  <a:schemeClr val="tx1">
+                    <a:lumMod val="50000"/>
+                    <a:lumOff val="50000"/>
+                  </a:schemeClr>
+                </a:solidFill>
+                <a:ea typeface="Open Sans Semibold" panose="020B0706030804020204" pitchFamily="34" charset="0"/>
+                <a:cs typeface="Open Sans Semibold" panose="020B0706030804020204" pitchFamily="34" charset="0"/>
+              </a:rPr>
+              <a:t>objectives</a:t>
+            </a:r>
+            <a:r>
+              <a:rPr lang="de-DE" sz="600" dirty="0">
+                <a:solidFill>
+                  <a:schemeClr val="tx1">
+                    <a:lumMod val="50000"/>
+                    <a:lumOff val="50000"/>
+                  </a:schemeClr>
+                </a:solidFill>
+                <a:ea typeface="Open Sans Semibold" panose="020B0706030804020204" pitchFamily="34" charset="0"/>
+                <a:cs typeface="Open Sans Semibold" panose="020B0706030804020204" pitchFamily="34" charset="0"/>
+              </a:rPr>
+              <a:t> </a:t>
+            </a:r>
+            <a:r>
+              <a:rPr lang="de-DE" sz="600" dirty="0" err="1">
+                <a:solidFill>
+                  <a:schemeClr val="tx1">
+                    <a:lumMod val="50000"/>
+                    <a:lumOff val="50000"/>
+                  </a:schemeClr>
+                </a:solidFill>
+                <a:ea typeface="Open Sans Semibold" panose="020B0706030804020204" pitchFamily="34" charset="0"/>
+                <a:cs typeface="Open Sans Semibold" panose="020B0706030804020204" pitchFamily="34" charset="0"/>
+              </a:rPr>
+              <a:t>arise</a:t>
+            </a:r>
+            <a:r>
+              <a:rPr lang="de-DE" sz="600" dirty="0">
+                <a:solidFill>
+                  <a:schemeClr val="tx1">
+                    <a:lumMod val="50000"/>
+                    <a:lumOff val="50000"/>
+                  </a:schemeClr>
+                </a:solidFill>
+                <a:ea typeface="Open Sans Semibold" panose="020B0706030804020204" pitchFamily="34" charset="0"/>
+                <a:cs typeface="Open Sans Semibold" panose="020B0706030804020204" pitchFamily="34" charset="0"/>
+              </a:rPr>
+              <a:t> </a:t>
+            </a:r>
+            <a:r>
+              <a:rPr lang="de-DE" sz="600" dirty="0" err="1">
+                <a:solidFill>
+                  <a:schemeClr val="tx1">
+                    <a:lumMod val="50000"/>
+                    <a:lumOff val="50000"/>
+                  </a:schemeClr>
+                </a:solidFill>
+                <a:ea typeface="Open Sans Semibold" panose="020B0706030804020204" pitchFamily="34" charset="0"/>
+                <a:cs typeface="Open Sans Semibold" panose="020B0706030804020204" pitchFamily="34" charset="0"/>
+              </a:rPr>
+              <a:t>the</a:t>
             </a:r>
             <a:r>
               <a:rPr lang="de-DE" sz="600" dirty="0">
@@ -4009,7 +4446,7 @@
         <p:spPr>
           <a:xfrm>
             <a:off x="4106041" y="768768"/>
-            <a:ext cx="1255472" cy="861774"/>
+            <a:ext cx="1654620" cy="769441"/>
           </a:xfrm>
           <a:prstGeom prst="rect">
             <a:avLst/>
@@ -4107,32 +4544,6 @@
                 <a:ea typeface="Open Sans Semibold" panose="020B0706030804020204" pitchFamily="34" charset="0"/>
                 <a:cs typeface="Open Sans Semibold" panose="020B0706030804020204" pitchFamily="34" charset="0"/>
               </a:rPr>
-              <a:t> am I </a:t>
-            </a:r>
-            <a:r>
-              <a:rPr lang="de-DE" sz="600" dirty="0" err="1">
-                <a:solidFill>
-                  <a:schemeClr val="tx1">
-                    <a:lumMod val="50000"/>
-                    <a:lumOff val="50000"/>
-                  </a:schemeClr>
-                </a:solidFill>
-                <a:ea typeface="Open Sans Semibold" panose="020B0706030804020204" pitchFamily="34" charset="0"/>
-                <a:cs typeface="Open Sans Semibold" panose="020B0706030804020204" pitchFamily="34" charset="0"/>
-              </a:rPr>
-              <a:t>trying</a:t>
-            </a:r>
-            <a:r>
-              <a:rPr lang="de-DE" sz="600" dirty="0">
-                <a:solidFill>
-                  <a:schemeClr val="tx1">
-                    <a:lumMod val="50000"/>
-                    <a:lumOff val="50000"/>
-                  </a:schemeClr>
-                </a:solidFill>
-                <a:ea typeface="Open Sans Semibold" panose="020B0706030804020204" pitchFamily="34" charset="0"/>
-                <a:cs typeface="Open Sans Semibold" panose="020B0706030804020204" pitchFamily="34" charset="0"/>
-              </a:rPr>
               <a:t> </a:t>
             </a:r>
             <a:r>
@@ -4146,33 +4557,176 @@
                 <a:ea typeface="Open Sans Semibold" panose="020B0706030804020204" pitchFamily="34" charset="0"/>
                 <a:cs typeface="Open Sans Semibold" panose="020B0706030804020204" pitchFamily="34" charset="0"/>
               </a:rPr>
-              <a:t>to</a:t>
-            </a:r>
-            <a:r>
-              <a:rPr lang="de-DE" sz="600" dirty="0">
-                <a:solidFill>
-                  <a:schemeClr val="tx1">
-                    <a:lumMod val="50000"/>
-                    <a:lumOff val="50000"/>
-                  </a:schemeClr>
-                </a:solidFill>
-                <a:ea typeface="Open Sans Semibold" panose="020B0706030804020204" pitchFamily="34" charset="0"/>
-                <a:cs typeface="Open Sans Semibold" panose="020B0706030804020204" pitchFamily="34" charset="0"/>
-              </a:rPr>
-              <a:t> do </a:t>
-            </a:r>
-            <a:r>
-              <a:rPr lang="de-DE" sz="600" dirty="0" err="1">
-                <a:solidFill>
-                  <a:schemeClr val="tx1">
-                    <a:lumMod val="50000"/>
-                    <a:lumOff val="50000"/>
-                  </a:schemeClr>
-                </a:solidFill>
-                <a:ea typeface="Open Sans Semibold" panose="020B0706030804020204" pitchFamily="34" charset="0"/>
-                <a:cs typeface="Open Sans Semibold" panose="020B0706030804020204" pitchFamily="34" charset="0"/>
-              </a:rPr>
-              <a:t>accomplish</a:t>
+              <a:t>are</a:t>
+            </a:r>
+            <a:r>
+              <a:rPr lang="de-DE" sz="600" dirty="0">
+                <a:solidFill>
+                  <a:schemeClr val="tx1">
+                    <a:lumMod val="50000"/>
+                    <a:lumOff val="50000"/>
+                  </a:schemeClr>
+                </a:solidFill>
+                <a:ea typeface="Open Sans Semibold" panose="020B0706030804020204" pitchFamily="34" charset="0"/>
+                <a:cs typeface="Open Sans Semibold" panose="020B0706030804020204" pitchFamily="34" charset="0"/>
+              </a:rPr>
+              <a:t> </a:t>
+            </a:r>
+            <a:r>
+              <a:rPr lang="de-DE" sz="600" dirty="0" err="1">
+                <a:solidFill>
+                  <a:schemeClr val="tx1">
+                    <a:lumMod val="50000"/>
+                    <a:lumOff val="50000"/>
+                  </a:schemeClr>
+                </a:solidFill>
+                <a:ea typeface="Open Sans Semibold" panose="020B0706030804020204" pitchFamily="34" charset="0"/>
+                <a:cs typeface="Open Sans Semibold" panose="020B0706030804020204" pitchFamily="34" charset="0"/>
+              </a:rPr>
+              <a:t>my</a:t>
+            </a:r>
+            <a:r>
+              <a:rPr lang="de-DE" sz="600" dirty="0">
+                <a:solidFill>
+                  <a:schemeClr val="tx1">
+                    <a:lumMod val="50000"/>
+                    <a:lumOff val="50000"/>
+                  </a:schemeClr>
+                </a:solidFill>
+                <a:ea typeface="Open Sans Semibold" panose="020B0706030804020204" pitchFamily="34" charset="0"/>
+                <a:cs typeface="Open Sans Semibold" panose="020B0706030804020204" pitchFamily="34" charset="0"/>
+              </a:rPr>
+              <a:t> </a:t>
+            </a:r>
+            <a:r>
+              <a:rPr lang="de-DE" sz="600" dirty="0" err="1">
+                <a:solidFill>
+                  <a:schemeClr val="tx1">
+                    <a:lumMod val="50000"/>
+                    <a:lumOff val="50000"/>
+                  </a:schemeClr>
+                </a:solidFill>
+                <a:ea typeface="Open Sans Semibold" panose="020B0706030804020204" pitchFamily="34" charset="0"/>
+                <a:cs typeface="Open Sans Semibold" panose="020B0706030804020204" pitchFamily="34" charset="0"/>
+              </a:rPr>
+              <a:t>objectives</a:t>
+            </a:r>
+            <a:r>
+              <a:rPr lang="de-DE" sz="600" dirty="0">
+                <a:solidFill>
+                  <a:schemeClr val="tx1">
+                    <a:lumMod val="50000"/>
+                    <a:lumOff val="50000"/>
+                  </a:schemeClr>
+                </a:solidFill>
+                <a:ea typeface="Open Sans Semibold" panose="020B0706030804020204" pitchFamily="34" charset="0"/>
+                <a:cs typeface="Open Sans Semibold" panose="020B0706030804020204" pitchFamily="34" charset="0"/>
+              </a:rPr>
+              <a:t> </a:t>
+            </a:r>
+            <a:r>
+              <a:rPr lang="de-DE" sz="600" dirty="0" err="1">
+                <a:solidFill>
+                  <a:schemeClr val="tx1">
+                    <a:lumMod val="50000"/>
+                    <a:lumOff val="50000"/>
+                  </a:schemeClr>
+                </a:solidFill>
+                <a:ea typeface="Open Sans Semibold" panose="020B0706030804020204" pitchFamily="34" charset="0"/>
+                <a:cs typeface="Open Sans Semibold" panose="020B0706030804020204" pitchFamily="34" charset="0"/>
+              </a:rPr>
+              <a:t>for</a:t>
+            </a:r>
+            <a:r>
+              <a:rPr lang="de-DE" sz="600" dirty="0">
+                <a:solidFill>
+                  <a:schemeClr val="tx1">
+                    <a:lumMod val="50000"/>
+                    <a:lumOff val="50000"/>
+                  </a:schemeClr>
+                </a:solidFill>
+                <a:ea typeface="Open Sans Semibold" panose="020B0706030804020204" pitchFamily="34" charset="0"/>
+                <a:cs typeface="Open Sans Semibold" panose="020B0706030804020204" pitchFamily="34" charset="0"/>
+              </a:rPr>
+              <a:t> </a:t>
+            </a:r>
+            <a:r>
+              <a:rPr lang="de-DE" sz="600" dirty="0" err="1">
+                <a:solidFill>
+                  <a:schemeClr val="tx1">
+                    <a:lumMod val="50000"/>
+                    <a:lumOff val="50000"/>
+                  </a:schemeClr>
+                </a:solidFill>
+                <a:ea typeface="Open Sans Semibold" panose="020B0706030804020204" pitchFamily="34" charset="0"/>
+                <a:cs typeface="Open Sans Semibold" panose="020B0706030804020204" pitchFamily="34" charset="0"/>
+              </a:rPr>
+              <a:t>the</a:t>
+            </a:r>
+            <a:r>
+              <a:rPr lang="de-DE" sz="600" dirty="0">
+                <a:solidFill>
+                  <a:schemeClr val="tx1">
+                    <a:lumMod val="50000"/>
+                    <a:lumOff val="50000"/>
+                  </a:schemeClr>
+                </a:solidFill>
+                <a:ea typeface="Open Sans Semibold" panose="020B0706030804020204" pitchFamily="34" charset="0"/>
+                <a:cs typeface="Open Sans Semibold" panose="020B0706030804020204" pitchFamily="34" charset="0"/>
+              </a:rPr>
+              <a:t> </a:t>
+            </a:r>
+            <a:r>
+              <a:rPr lang="de-DE" sz="600" dirty="0" err="1">
+                <a:solidFill>
+                  <a:schemeClr val="tx1">
+                    <a:lumMod val="50000"/>
+                    <a:lumOff val="50000"/>
+                  </a:schemeClr>
+                </a:solidFill>
+                <a:ea typeface="Open Sans Semibold" panose="020B0706030804020204" pitchFamily="34" charset="0"/>
+                <a:cs typeface="Open Sans Semibold" panose="020B0706030804020204" pitchFamily="34" charset="0"/>
+              </a:rPr>
+              <a:t>next</a:t>
+            </a:r>
+            <a:r>
+              <a:rPr lang="de-DE" sz="600" dirty="0">
+                <a:solidFill>
+                  <a:schemeClr val="tx1">
+                    <a:lumMod val="50000"/>
+                    <a:lumOff val="50000"/>
+                  </a:schemeClr>
+                </a:solidFill>
+                <a:ea typeface="Open Sans Semibold" panose="020B0706030804020204" pitchFamily="34" charset="0"/>
+                <a:cs typeface="Open Sans Semibold" panose="020B0706030804020204" pitchFamily="34" charset="0"/>
+              </a:rPr>
+              <a:t> 12 </a:t>
+            </a:r>
+            <a:r>
+              <a:rPr lang="de-DE" sz="600" dirty="0" err="1">
+                <a:solidFill>
+                  <a:schemeClr val="tx1">
+                    <a:lumMod val="50000"/>
+                    <a:lumOff val="50000"/>
+                  </a:schemeClr>
+                </a:solidFill>
+                <a:ea typeface="Open Sans Semibold" panose="020B0706030804020204" pitchFamily="34" charset="0"/>
+                <a:cs typeface="Open Sans Semibold" panose="020B0706030804020204" pitchFamily="34" charset="0"/>
+              </a:rPr>
+              <a:t>weeks</a:t>
+            </a:r>
+            <a:r>
+              <a:rPr lang="de-DE" sz="600" dirty="0">
+                <a:solidFill>
+                  <a:schemeClr val="tx1">
+                    <a:lumMod val="50000"/>
+                    <a:lumOff val="50000"/>
+                  </a:schemeClr>
+                </a:solidFill>
+                <a:ea typeface="Open Sans Semibold" panose="020B0706030804020204" pitchFamily="34" charset="0"/>
+                <a:cs typeface="Open Sans Semibold" panose="020B0706030804020204" pitchFamily="34" charset="0"/>
+              </a:rPr>
+              <a:t>?</a:t>
             </a:r>
             <a:br>
               <a:rPr lang="de-DE" sz="600" dirty="0">
@@ -4197,6 +4751,84 @@
                 <a:ea typeface="Open Sans Semibold" panose="020B0706030804020204" pitchFamily="34" charset="0"/>
                 <a:cs typeface="Open Sans Semibold" panose="020B0706030804020204" pitchFamily="34" charset="0"/>
               </a:rPr>
+              <a:t>What</a:t>
+            </a:r>
+            <a:r>
+              <a:rPr lang="de-DE" sz="600" dirty="0">
+                <a:solidFill>
+                  <a:schemeClr val="tx1">
+                    <a:lumMod val="50000"/>
+                    <a:lumOff val="50000"/>
+                  </a:schemeClr>
+                </a:solidFill>
+                <a:ea typeface="Open Sans Semibold" panose="020B0706030804020204" pitchFamily="34" charset="0"/>
+                <a:cs typeface="Open Sans Semibold" panose="020B0706030804020204" pitchFamily="34" charset="0"/>
+              </a:rPr>
+              <a:t> </a:t>
+            </a:r>
+            <a:r>
+              <a:rPr lang="de-DE" sz="600" dirty="0" err="1">
+                <a:solidFill>
+                  <a:schemeClr val="tx1">
+                    <a:lumMod val="50000"/>
+                    <a:lumOff val="50000"/>
+                  </a:schemeClr>
+                </a:solidFill>
+                <a:ea typeface="Open Sans Semibold" panose="020B0706030804020204" pitchFamily="34" charset="0"/>
+                <a:cs typeface="Open Sans Semibold" panose="020B0706030804020204" pitchFamily="34" charset="0"/>
+              </a:rPr>
+              <a:t>should</a:t>
+            </a:r>
+            <a:r>
+              <a:rPr lang="de-DE" sz="600" dirty="0">
+                <a:solidFill>
+                  <a:schemeClr val="tx1">
+                    <a:lumMod val="50000"/>
+                    <a:lumOff val="50000"/>
+                  </a:schemeClr>
+                </a:solidFill>
+                <a:ea typeface="Open Sans Semibold" panose="020B0706030804020204" pitchFamily="34" charset="0"/>
+                <a:cs typeface="Open Sans Semibold" panose="020B0706030804020204" pitchFamily="34" charset="0"/>
+              </a:rPr>
+              <a:t> </a:t>
+            </a:r>
+            <a:r>
+              <a:rPr lang="de-DE" sz="600" dirty="0" err="1">
+                <a:solidFill>
+                  <a:schemeClr val="tx1">
+                    <a:lumMod val="50000"/>
+                    <a:lumOff val="50000"/>
+                  </a:schemeClr>
+                </a:solidFill>
+                <a:ea typeface="Open Sans Semibold" panose="020B0706030804020204" pitchFamily="34" charset="0"/>
+                <a:cs typeface="Open Sans Semibold" panose="020B0706030804020204" pitchFamily="34" charset="0"/>
+              </a:rPr>
+              <a:t>be</a:t>
+            </a:r>
+            <a:r>
+              <a:rPr lang="de-DE" sz="600" dirty="0">
+                <a:solidFill>
+                  <a:schemeClr val="tx1">
+                    <a:lumMod val="50000"/>
+                    <a:lumOff val="50000"/>
+                  </a:schemeClr>
+                </a:solidFill>
+                <a:ea typeface="Open Sans Semibold" panose="020B0706030804020204" pitchFamily="34" charset="0"/>
+                <a:cs typeface="Open Sans Semibold" panose="020B0706030804020204" pitchFamily="34" charset="0"/>
+              </a:rPr>
+              <a:t> </a:t>
+            </a:r>
+            <a:r>
+              <a:rPr lang="de-DE" sz="600" dirty="0" err="1">
+                <a:solidFill>
+                  <a:schemeClr val="tx1">
+                    <a:lumMod val="50000"/>
+                    <a:lumOff val="50000"/>
+                  </a:schemeClr>
+                </a:solidFill>
+                <a:ea typeface="Open Sans Semibold" panose="020B0706030804020204" pitchFamily="34" charset="0"/>
+                <a:cs typeface="Open Sans Semibold" panose="020B0706030804020204" pitchFamily="34" charset="0"/>
+              </a:rPr>
               <a:t>the</a:t>
             </a:r>
             <a:r>
@@ -4223,100 +4855,16 @@
                 <a:ea typeface="Open Sans Semibold" panose="020B0706030804020204" pitchFamily="34" charset="0"/>
                 <a:cs typeface="Open Sans Semibold" panose="020B0706030804020204" pitchFamily="34" charset="0"/>
               </a:rPr>
-              <a:t>next</a:t>
-            </a:r>
-            <a:r>
-              <a:rPr lang="de-DE" sz="600" dirty="0">
-                <a:solidFill>
-                  <a:schemeClr val="tx1">
-                    <a:lumMod val="50000"/>
-                    <a:lumOff val="50000"/>
-                  </a:schemeClr>
-                </a:solidFill>
-                <a:ea typeface="Open Sans Semibold" panose="020B0706030804020204" pitchFamily="34" charset="0"/>
-                <a:cs typeface="Open Sans Semibold" panose="020B0706030804020204" pitchFamily="34" charset="0"/>
-              </a:rPr>
-              <a:t> 12 </a:t>
-            </a:r>
-            <a:r>
-              <a:rPr lang="de-DE" sz="600" dirty="0" err="1">
-                <a:solidFill>
-                  <a:schemeClr val="tx1">
-                    <a:lumMod val="50000"/>
-                    <a:lumOff val="50000"/>
-                  </a:schemeClr>
-                </a:solidFill>
-                <a:ea typeface="Open Sans Semibold" panose="020B0706030804020204" pitchFamily="34" charset="0"/>
-                <a:cs typeface="Open Sans Semibold" panose="020B0706030804020204" pitchFamily="34" charset="0"/>
-              </a:rPr>
-              <a:t>weeks</a:t>
-            </a:r>
-            <a:r>
-              <a:rPr lang="de-DE" sz="600" dirty="0">
-                <a:solidFill>
-                  <a:schemeClr val="tx1">
-                    <a:lumMod val="50000"/>
-                    <a:lumOff val="50000"/>
-                  </a:schemeClr>
-                </a:solidFill>
-                <a:ea typeface="Open Sans Semibold" panose="020B0706030804020204" pitchFamily="34" charset="0"/>
-                <a:cs typeface="Open Sans Semibold" panose="020B0706030804020204" pitchFamily="34" charset="0"/>
-              </a:rPr>
-              <a:t>?</a:t>
-            </a:r>
-          </a:p>
-          <a:p>
-            <a:r>
-              <a:rPr lang="de-DE" sz="600" dirty="0" err="1">
-                <a:solidFill>
-                  <a:schemeClr val="tx1">
-                    <a:lumMod val="50000"/>
-                    <a:lumOff val="50000"/>
-                  </a:schemeClr>
-                </a:solidFill>
-                <a:latin typeface="Bodoni MT" panose="02070603080606020203" pitchFamily="18" charset="0"/>
-                <a:ea typeface="Open Sans Semibold" panose="020B0706030804020204" pitchFamily="34" charset="0"/>
-                <a:cs typeface="Open Sans Semibold" panose="020B0706030804020204" pitchFamily="34" charset="0"/>
-              </a:rPr>
-              <a:t>How</a:t>
-            </a:r>
-            <a:r>
-              <a:rPr lang="de-DE" sz="600" dirty="0">
-                <a:solidFill>
-                  <a:schemeClr val="tx1">
-                    <a:lumMod val="50000"/>
-                    <a:lumOff val="50000"/>
-                  </a:schemeClr>
-                </a:solidFill>
-                <a:latin typeface="Bodoni MT" panose="02070603080606020203" pitchFamily="18" charset="0"/>
-                <a:ea typeface="Open Sans Semibold" panose="020B0706030804020204" pitchFamily="34" charset="0"/>
-                <a:cs typeface="Open Sans Semibold" panose="020B0706030804020204" pitchFamily="34" charset="0"/>
-              </a:rPr>
-              <a:t> do I </a:t>
-            </a:r>
-            <a:r>
-              <a:rPr lang="de-DE" sz="600" dirty="0" err="1">
-                <a:solidFill>
-                  <a:schemeClr val="tx1">
-                    <a:lumMod val="50000"/>
-                    <a:lumOff val="50000"/>
-                  </a:schemeClr>
-                </a:solidFill>
-                <a:latin typeface="Bodoni MT" panose="02070603080606020203" pitchFamily="18" charset="0"/>
-                <a:ea typeface="Open Sans Semibold" panose="020B0706030804020204" pitchFamily="34" charset="0"/>
-                <a:cs typeface="Open Sans Semibold" panose="020B0706030804020204" pitchFamily="34" charset="0"/>
-              </a:rPr>
-              <a:t>measure</a:t>
-            </a:r>
-            <a:r>
-              <a:rPr lang="de-DE" sz="600" dirty="0">
-                <a:solidFill>
-                  <a:schemeClr val="tx1">
-                    <a:lumMod val="50000"/>
-                    <a:lumOff val="50000"/>
-                  </a:schemeClr>
-                </a:solidFill>
-                <a:latin typeface="Bodoni MT" panose="02070603080606020203" pitchFamily="18" charset="0"/>
+              <a:t>measurable</a:t>
+            </a:r>
+            <a:r>
+              <a:rPr lang="de-DE" sz="600" dirty="0">
+                <a:solidFill>
+                  <a:schemeClr val="tx1">
+                    <a:lumMod val="50000"/>
+                    <a:lumOff val="50000"/>
+                  </a:schemeClr>
+                </a:solidFill>
                 <a:ea typeface="Open Sans Semibold" panose="020B0706030804020204" pitchFamily="34" charset="0"/>
                 <a:cs typeface="Open Sans Semibold" panose="020B0706030804020204" pitchFamily="34" charset="0"/>
               </a:rPr>
@@ -4330,21 +4878,19 @@
                     <a:lumOff val="50000"/>
                   </a:schemeClr>
                 </a:solidFill>
-                <a:latin typeface="Bodoni MT" panose="02070603080606020203" pitchFamily="18" charset="0"/>
-                <a:ea typeface="Open Sans Semibold" panose="020B0706030804020204" pitchFamily="34" charset="0"/>
-                <a:cs typeface="Open Sans Semibold" panose="020B0706030804020204" pitchFamily="34" charset="0"/>
-              </a:rPr>
-              <a:t>success</a:t>
-            </a:r>
-            <a:r>
-              <a:rPr lang="de-DE" sz="600" dirty="0">
-                <a:solidFill>
-                  <a:schemeClr val="tx1">
-                    <a:lumMod val="50000"/>
-                    <a:lumOff val="50000"/>
-                  </a:schemeClr>
-                </a:solidFill>
-                <a:latin typeface="Bodoni MT" panose="02070603080606020203" pitchFamily="18" charset="0"/>
+                <a:ea typeface="Open Sans Semibold" panose="020B0706030804020204" pitchFamily="34" charset="0"/>
+                <a:cs typeface="Open Sans Semibold" panose="020B0706030804020204" pitchFamily="34" charset="0"/>
+              </a:rPr>
+              <a:t>results</a:t>
+            </a:r>
+            <a:r>
+              <a:rPr lang="de-DE" sz="600" dirty="0">
+                <a:solidFill>
+                  <a:schemeClr val="tx1">
+                    <a:lumMod val="50000"/>
+                    <a:lumOff val="50000"/>
+                  </a:schemeClr>
+                </a:solidFill>
                 <a:ea typeface="Open Sans Semibold" panose="020B0706030804020204" pitchFamily="34" charset="0"/>
                 <a:cs typeface="Open Sans Semibold" panose="020B0706030804020204" pitchFamily="34" charset="0"/>
               </a:rPr>
@@ -4368,7 +4914,7 @@
         <p:spPr>
           <a:xfrm>
             <a:off x="5826957" y="755049"/>
-            <a:ext cx="1099981" cy="754053"/>
+            <a:ext cx="1556836" cy="754053"/>
           </a:xfrm>
           <a:prstGeom prst="rect">
             <a:avLst/>
@@ -4440,7 +4986,58 @@
                 <a:ea typeface="Open Sans Semibold" panose="020B0706030804020204" pitchFamily="34" charset="0"/>
                 <a:cs typeface="Open Sans Semibold" panose="020B0706030804020204" pitchFamily="34" charset="0"/>
               </a:rPr>
-              <a:t>What</a:t>
+              <a:t>Which</a:t>
+            </a:r>
+            <a:r>
+              <a:rPr lang="de-DE" sz="600" dirty="0">
+                <a:solidFill>
+                  <a:schemeClr val="tx1">
+                    <a:lumMod val="50000"/>
+                    <a:lumOff val="50000"/>
+                  </a:schemeClr>
+                </a:solidFill>
+                <a:ea typeface="Open Sans Semibold" panose="020B0706030804020204" pitchFamily="34" charset="0"/>
+                <a:cs typeface="Open Sans Semibold" panose="020B0706030804020204" pitchFamily="34" charset="0"/>
+              </a:rPr>
+              <a:t> internal and external social </a:t>
+            </a:r>
+            <a:r>
+              <a:rPr lang="de-DE" sz="600" dirty="0" err="1">
+                <a:solidFill>
+                  <a:schemeClr val="tx1">
+                    <a:lumMod val="50000"/>
+                    <a:lumOff val="50000"/>
+                  </a:schemeClr>
+                </a:solidFill>
+                <a:ea typeface="Open Sans Semibold" panose="020B0706030804020204" pitchFamily="34" charset="0"/>
+                <a:cs typeface="Open Sans Semibold" panose="020B0706030804020204" pitchFamily="34" charset="0"/>
+              </a:rPr>
+              <a:t>networks</a:t>
+            </a:r>
+            <a:br>
+              <a:rPr lang="de-DE" sz="600" dirty="0">
+                <a:solidFill>
+                  <a:schemeClr val="tx1">
+                    <a:lumMod val="50000"/>
+                    <a:lumOff val="50000"/>
+                  </a:schemeClr>
+                </a:solidFill>
+                <a:ea typeface="Open Sans Semibold" panose="020B0706030804020204" pitchFamily="34" charset="0"/>
+                <a:cs typeface="Open Sans Semibold" panose="020B0706030804020204" pitchFamily="34" charset="0"/>
+              </a:rPr>
+            </a:br>
+            <a:r>
+              <a:rPr lang="de-DE" sz="600" dirty="0" err="1">
+                <a:solidFill>
+                  <a:schemeClr val="tx1">
+                    <a:lumMod val="50000"/>
+                    <a:lumOff val="50000"/>
+                  </a:schemeClr>
+                </a:solidFill>
+                <a:ea typeface="Open Sans Semibold" panose="020B0706030804020204" pitchFamily="34" charset="0"/>
+                <a:cs typeface="Open Sans Semibold" panose="020B0706030804020204" pitchFamily="34" charset="0"/>
+              </a:rPr>
+              <a:t>can</a:t>
             </a:r>
             <a:r>
               <a:rPr lang="de-DE" sz="600" dirty="0">
@@ -4466,7 +5063,7 @@
                 <a:ea typeface="Open Sans Semibold" panose="020B0706030804020204" pitchFamily="34" charset="0"/>
                 <a:cs typeface="Open Sans Semibold" panose="020B0706030804020204" pitchFamily="34" charset="0"/>
               </a:rPr>
-              <a:t>are</a:t>
+              <a:t>help</a:t>
             </a:r>
             <a:r>
               <a:rPr lang="de-DE" sz="600" dirty="0">
@@ -4492,71 +5089,7 @@
                 <a:ea typeface="Open Sans Semibold" panose="020B0706030804020204" pitchFamily="34" charset="0"/>
                 <a:cs typeface="Open Sans Semibold" panose="020B0706030804020204" pitchFamily="34" charset="0"/>
               </a:rPr>
-              <a:t>the</a:t>
-            </a:r>
-            <a:r>
-              <a:rPr lang="de-DE" sz="600" dirty="0">
-                <a:solidFill>
-                  <a:schemeClr val="tx1">
-                    <a:lumMod val="50000"/>
-                    <a:lumOff val="50000"/>
-                  </a:schemeClr>
-                </a:solidFill>
-                <a:ea typeface="Open Sans Semibold" panose="020B0706030804020204" pitchFamily="34" charset="0"/>
-                <a:cs typeface="Open Sans Semibold" panose="020B0706030804020204" pitchFamily="34" charset="0"/>
-              </a:rPr>
-              <a:t> social </a:t>
-            </a:r>
-            <a:r>
-              <a:rPr lang="de-DE" sz="600" dirty="0" err="1">
-                <a:solidFill>
-                  <a:schemeClr val="tx1">
-                    <a:lumMod val="50000"/>
-                    <a:lumOff val="50000"/>
-                  </a:schemeClr>
-                </a:solidFill>
-                <a:ea typeface="Open Sans Semibold" panose="020B0706030804020204" pitchFamily="34" charset="0"/>
-                <a:cs typeface="Open Sans Semibold" panose="020B0706030804020204" pitchFamily="34" charset="0"/>
-              </a:rPr>
-              <a:t>networks</a:t>
-            </a:r>
-            <a:br>
-              <a:rPr lang="de-DE" sz="600" dirty="0">
-                <a:solidFill>
-                  <a:schemeClr val="tx1">
-                    <a:lumMod val="50000"/>
-                    <a:lumOff val="50000"/>
-                  </a:schemeClr>
-                </a:solidFill>
-                <a:ea typeface="Open Sans Semibold" panose="020B0706030804020204" pitchFamily="34" charset="0"/>
-                <a:cs typeface="Open Sans Semibold" panose="020B0706030804020204" pitchFamily="34" charset="0"/>
-              </a:rPr>
-            </a:br>
-            <a:r>
-              <a:rPr lang="de-DE" sz="600" dirty="0">
-                <a:solidFill>
-                  <a:schemeClr val="tx1">
-                    <a:lumMod val="50000"/>
-                    <a:lumOff val="50000"/>
-                  </a:schemeClr>
-                </a:solidFill>
-                <a:ea typeface="Open Sans Semibold" panose="020B0706030804020204" pitchFamily="34" charset="0"/>
-                <a:cs typeface="Open Sans Semibold" panose="020B0706030804020204" pitchFamily="34" charset="0"/>
-              </a:rPr>
-              <a:t>I am </a:t>
-            </a:r>
-            <a:r>
-              <a:rPr lang="de-DE" sz="600" dirty="0" err="1">
-                <a:solidFill>
-                  <a:schemeClr val="tx1">
-                    <a:lumMod val="50000"/>
-                    <a:lumOff val="50000"/>
-                  </a:schemeClr>
-                </a:solidFill>
-                <a:ea typeface="Open Sans Semibold" panose="020B0706030804020204" pitchFamily="34" charset="0"/>
-                <a:cs typeface="Open Sans Semibold" panose="020B0706030804020204" pitchFamily="34" charset="0"/>
-              </a:rPr>
-              <a:t>member</a:t>
+              <a:t>me</a:t>
             </a:r>
             <a:r>
               <a:rPr lang="de-DE" sz="600" dirty="0">
@@ -4582,7 +5115,85 @@
                 <a:ea typeface="Open Sans Semibold" panose="020B0706030804020204" pitchFamily="34" charset="0"/>
                 <a:cs typeface="Open Sans Semibold" panose="020B0706030804020204" pitchFamily="34" charset="0"/>
               </a:rPr>
-              <a:t>of</a:t>
+              <a:t>to</a:t>
+            </a:r>
+            <a:r>
+              <a:rPr lang="de-DE" sz="600" dirty="0">
+                <a:solidFill>
+                  <a:schemeClr val="tx1">
+                    <a:lumMod val="50000"/>
+                    <a:lumOff val="50000"/>
+                  </a:schemeClr>
+                </a:solidFill>
+                <a:ea typeface="Open Sans Semibold" panose="020B0706030804020204" pitchFamily="34" charset="0"/>
+                <a:cs typeface="Open Sans Semibold" panose="020B0706030804020204" pitchFamily="34" charset="0"/>
+              </a:rPr>
+              <a:t> </a:t>
+            </a:r>
+            <a:r>
+              <a:rPr lang="de-DE" sz="600" dirty="0" err="1">
+                <a:solidFill>
+                  <a:schemeClr val="tx1">
+                    <a:lumMod val="50000"/>
+                    <a:lumOff val="50000"/>
+                  </a:schemeClr>
+                </a:solidFill>
+                <a:ea typeface="Open Sans Semibold" panose="020B0706030804020204" pitchFamily="34" charset="0"/>
+                <a:cs typeface="Open Sans Semibold" panose="020B0706030804020204" pitchFamily="34" charset="0"/>
+              </a:rPr>
+              <a:t>connect</a:t>
+            </a:r>
+            <a:r>
+              <a:rPr lang="de-DE" sz="600" dirty="0">
+                <a:solidFill>
+                  <a:schemeClr val="tx1">
+                    <a:lumMod val="50000"/>
+                    <a:lumOff val="50000"/>
+                  </a:schemeClr>
+                </a:solidFill>
+                <a:ea typeface="Open Sans Semibold" panose="020B0706030804020204" pitchFamily="34" charset="0"/>
+                <a:cs typeface="Open Sans Semibold" panose="020B0706030804020204" pitchFamily="34" charset="0"/>
+              </a:rPr>
+              <a:t> </a:t>
+            </a:r>
+            <a:r>
+              <a:rPr lang="de-DE" sz="600" dirty="0" err="1">
+                <a:solidFill>
+                  <a:schemeClr val="tx1">
+                    <a:lumMod val="50000"/>
+                    <a:lumOff val="50000"/>
+                  </a:schemeClr>
+                </a:solidFill>
+                <a:ea typeface="Open Sans Semibold" panose="020B0706030804020204" pitchFamily="34" charset="0"/>
+                <a:cs typeface="Open Sans Semibold" panose="020B0706030804020204" pitchFamily="34" charset="0"/>
+              </a:rPr>
+              <a:t>with</a:t>
+            </a:r>
+            <a:r>
+              <a:rPr lang="de-DE" sz="600" dirty="0">
+                <a:solidFill>
+                  <a:schemeClr val="tx1">
+                    <a:lumMod val="50000"/>
+                    <a:lumOff val="50000"/>
+                  </a:schemeClr>
+                </a:solidFill>
+                <a:ea typeface="Open Sans Semibold" panose="020B0706030804020204" pitchFamily="34" charset="0"/>
+                <a:cs typeface="Open Sans Semibold" panose="020B0706030804020204" pitchFamily="34" charset="0"/>
+              </a:rPr>
+              <a:t> </a:t>
+            </a:r>
+            <a:r>
+              <a:rPr lang="de-DE" sz="600" dirty="0" err="1">
+                <a:solidFill>
+                  <a:schemeClr val="tx1">
+                    <a:lumMod val="50000"/>
+                    <a:lumOff val="50000"/>
+                  </a:schemeClr>
+                </a:solidFill>
+                <a:ea typeface="Open Sans Semibold" panose="020B0706030804020204" pitchFamily="34" charset="0"/>
+                <a:cs typeface="Open Sans Semibold" panose="020B0706030804020204" pitchFamily="34" charset="0"/>
+              </a:rPr>
+              <a:t>others</a:t>
             </a:r>
             <a:r>
               <a:rPr lang="de-DE" sz="600" dirty="0">
@@ -4716,7 +5327,33 @@
                 <a:ea typeface="Open Sans Semibold" panose="020B0706030804020204" pitchFamily="34" charset="0"/>
                 <a:cs typeface="Open Sans Semibold" panose="020B0706030804020204" pitchFamily="34" charset="0"/>
               </a:rPr>
-              <a:t> do I </a:t>
+              <a:t> </a:t>
+            </a:r>
+            <a:r>
+              <a:rPr lang="de-DE" sz="600" dirty="0" err="1">
+                <a:solidFill>
+                  <a:schemeClr val="tx1">
+                    <a:lumMod val="50000"/>
+                    <a:lumOff val="50000"/>
+                  </a:schemeClr>
+                </a:solidFill>
+                <a:ea typeface="Open Sans Semibold" panose="020B0706030804020204" pitchFamily="34" charset="0"/>
+                <a:cs typeface="Open Sans Semibold" panose="020B0706030804020204" pitchFamily="34" charset="0"/>
+              </a:rPr>
+              <a:t>can</a:t>
+            </a:r>
+            <a:r>
+              <a:rPr lang="de-DE" sz="600" dirty="0">
+                <a:solidFill>
+                  <a:schemeClr val="tx1">
+                    <a:lumMod val="50000"/>
+                    <a:lumOff val="50000"/>
+                  </a:schemeClr>
+                </a:solidFill>
+                <a:ea typeface="Open Sans Semibold" panose="020B0706030804020204" pitchFamily="34" charset="0"/>
+                <a:cs typeface="Open Sans Semibold" panose="020B0706030804020204" pitchFamily="34" charset="0"/>
+              </a:rPr>
+              <a:t> I </a:t>
             </a:r>
             <a:r>
               <a:rPr lang="de-DE" sz="600" dirty="0" err="1">
@@ -4819,33 +5456,33 @@
                 <a:ea typeface="Open Sans Semibold" panose="020B0706030804020204" pitchFamily="34" charset="0"/>
                 <a:cs typeface="Open Sans Semibold" panose="020B0706030804020204" pitchFamily="34" charset="0"/>
               </a:rPr>
+              <a:t>knowledge</a:t>
+            </a:r>
+            <a:r>
+              <a:rPr lang="de-DE" sz="600" dirty="0">
+                <a:solidFill>
+                  <a:schemeClr val="tx1">
+                    <a:lumMod val="50000"/>
+                    <a:lumOff val="50000"/>
+                  </a:schemeClr>
+                </a:solidFill>
+                <a:ea typeface="Open Sans Semibold" panose="020B0706030804020204" pitchFamily="34" charset="0"/>
+                <a:cs typeface="Open Sans Semibold" panose="020B0706030804020204" pitchFamily="34" charset="0"/>
+              </a:rPr>
+              <a:t> </a:t>
+            </a:r>
+            <a:r>
+              <a:rPr lang="de-DE" sz="600" dirty="0" err="1">
+                <a:solidFill>
+                  <a:schemeClr val="tx1">
+                    <a:lumMod val="50000"/>
+                    <a:lumOff val="50000"/>
+                  </a:schemeClr>
+                </a:solidFill>
+                <a:ea typeface="Open Sans Semibold" panose="020B0706030804020204" pitchFamily="34" charset="0"/>
+                <a:cs typeface="Open Sans Semibold" panose="020B0706030804020204" pitchFamily="34" charset="0"/>
+              </a:rPr>
               <a:t>assets</a:t>
-            </a:r>
-            <a:r>
-              <a:rPr lang="de-DE" sz="600" dirty="0">
-                <a:solidFill>
-                  <a:schemeClr val="tx1">
-                    <a:lumMod val="50000"/>
-                    <a:lumOff val="50000"/>
-                  </a:schemeClr>
-                </a:solidFill>
-                <a:ea typeface="Open Sans Semibold" panose="020B0706030804020204" pitchFamily="34" charset="0"/>
-                <a:cs typeface="Open Sans Semibold" panose="020B0706030804020204" pitchFamily="34" charset="0"/>
-              </a:rPr>
-              <a:t> </a:t>
-            </a:r>
-            <a:r>
-              <a:rPr lang="de-DE" sz="600" dirty="0" err="1">
-                <a:solidFill>
-                  <a:schemeClr val="tx1">
-                    <a:lumMod val="50000"/>
-                    <a:lumOff val="50000"/>
-                  </a:schemeClr>
-                </a:solidFill>
-                <a:ea typeface="Open Sans Semibold" panose="020B0706030804020204" pitchFamily="34" charset="0"/>
-                <a:cs typeface="Open Sans Semibold" panose="020B0706030804020204" pitchFamily="34" charset="0"/>
-              </a:rPr>
-              <a:t>openly</a:t>
             </a:r>
             <a:r>
               <a:rPr lang="de-DE" sz="600" dirty="0">
@@ -4877,8 +5514,8 @@
         </p:nvSpPr>
         <p:spPr>
           <a:xfrm>
-            <a:off x="7549422" y="755049"/>
-            <a:ext cx="1024448" cy="769441"/>
+            <a:off x="7549421" y="755049"/>
+            <a:ext cx="1699201" cy="769441"/>
           </a:xfrm>
           <a:prstGeom prst="rect">
             <a:avLst/>
@@ -4886,7 +5523,7 @@
           <a:noFill/>
         </p:spPr>
         <p:txBody>
-          <a:bodyPr wrap="none" rtlCol="0">
+          <a:bodyPr wrap="square" rtlCol="0">
             <a:spAutoFit/>
           </a:bodyPr>
           <a:lstStyle/>
@@ -5030,7 +5667,7 @@
                 <a:ea typeface="Open Sans Semibold" panose="020B0706030804020204" pitchFamily="34" charset="0"/>
                 <a:cs typeface="Open Sans Semibold" panose="020B0706030804020204" pitchFamily="34" charset="0"/>
               </a:rPr>
-              <a:t>to</a:t>
+              <a:t>with</a:t>
             </a:r>
             <a:r>
               <a:rPr lang="de-DE" sz="600" dirty="0">
@@ -5056,31 +5693,6 @@
                 <a:ea typeface="Open Sans Semibold" panose="020B0706030804020204" pitchFamily="34" charset="0"/>
                 <a:cs typeface="Open Sans Semibold" panose="020B0706030804020204" pitchFamily="34" charset="0"/>
               </a:rPr>
-              <a:t>reach</a:t>
-            </a:r>
-            <a:endParaRPr lang="de-DE" sz="600" dirty="0">
-              <a:solidFill>
-                <a:schemeClr val="tx1">
-                  <a:lumMod val="50000"/>
-                  <a:lumOff val="50000"/>
-                </a:schemeClr>
-              </a:solidFill>
-              <a:ea typeface="Open Sans Semibold" panose="020B0706030804020204" pitchFamily="34" charset="0"/>
-              <a:cs typeface="Open Sans Semibold" panose="020B0706030804020204" pitchFamily="34" charset="0"/>
-            </a:endParaRPr>
-          </a:p>
-          <a:p>
-            <a:r>
-              <a:rPr lang="de-DE" sz="600" dirty="0" err="1">
-                <a:solidFill>
-                  <a:schemeClr val="tx1">
-                    <a:lumMod val="50000"/>
-                    <a:lumOff val="50000"/>
-                  </a:schemeClr>
-                </a:solidFill>
-                <a:ea typeface="Open Sans Semibold" panose="020B0706030804020204" pitchFamily="34" charset="0"/>
-                <a:cs typeface="Open Sans Semibold" panose="020B0706030804020204" pitchFamily="34" charset="0"/>
-              </a:rPr>
               <a:t>my</a:t>
             </a:r>
             <a:r>
@@ -5108,6 +5720,135 @@
                 <a:cs typeface="Open Sans Semibold" panose="020B0706030804020204" pitchFamily="34" charset="0"/>
               </a:rPr>
               <a:t>objectives</a:t>
+            </a:r>
+            <a:r>
+              <a:rPr lang="de-DE" sz="600" dirty="0">
+                <a:solidFill>
+                  <a:schemeClr val="tx1">
+                    <a:lumMod val="50000"/>
+                    <a:lumOff val="50000"/>
+                  </a:schemeClr>
+                </a:solidFill>
+                <a:ea typeface="Open Sans Semibold" panose="020B0706030804020204" pitchFamily="34" charset="0"/>
+                <a:cs typeface="Open Sans Semibold" panose="020B0706030804020204" pitchFamily="34" charset="0"/>
+              </a:rPr>
+              <a:t>?</a:t>
+            </a:r>
+            <a:br>
+              <a:rPr lang="de-DE" sz="600" dirty="0">
+                <a:solidFill>
+                  <a:schemeClr val="tx1">
+                    <a:lumMod val="50000"/>
+                    <a:lumOff val="50000"/>
+                  </a:schemeClr>
+                </a:solidFill>
+                <a:ea typeface="Open Sans Semibold" panose="020B0706030804020204" pitchFamily="34" charset="0"/>
+                <a:cs typeface="Open Sans Semibold" panose="020B0706030804020204" pitchFamily="34" charset="0"/>
+              </a:rPr>
+            </a:br>
+            <a:r>
+              <a:rPr lang="de-DE" sz="600" dirty="0">
+                <a:solidFill>
+                  <a:schemeClr val="tx1">
+                    <a:lumMod val="50000"/>
+                    <a:lumOff val="50000"/>
+                  </a:schemeClr>
+                </a:solidFill>
+                <a:ea typeface="Open Sans Semibold" panose="020B0706030804020204" pitchFamily="34" charset="0"/>
+                <a:cs typeface="Open Sans Semibold" panose="020B0706030804020204" pitchFamily="34" charset="0"/>
+              </a:rPr>
+              <a:t>Do I </a:t>
+            </a:r>
+            <a:r>
+              <a:rPr lang="de-DE" sz="600" dirty="0" err="1">
+                <a:solidFill>
+                  <a:schemeClr val="tx1">
+                    <a:lumMod val="50000"/>
+                    <a:lumOff val="50000"/>
+                  </a:schemeClr>
+                </a:solidFill>
+                <a:ea typeface="Open Sans Semibold" panose="020B0706030804020204" pitchFamily="34" charset="0"/>
+                <a:cs typeface="Open Sans Semibold" panose="020B0706030804020204" pitchFamily="34" charset="0"/>
+              </a:rPr>
+              <a:t>know</a:t>
+            </a:r>
+            <a:r>
+              <a:rPr lang="de-DE" sz="600" dirty="0">
+                <a:solidFill>
+                  <a:schemeClr val="tx1">
+                    <a:lumMod val="50000"/>
+                    <a:lumOff val="50000"/>
+                  </a:schemeClr>
+                </a:solidFill>
+                <a:ea typeface="Open Sans Semibold" panose="020B0706030804020204" pitchFamily="34" charset="0"/>
+                <a:cs typeface="Open Sans Semibold" panose="020B0706030804020204" pitchFamily="34" charset="0"/>
+              </a:rPr>
+              <a:t> </a:t>
+            </a:r>
+            <a:r>
+              <a:rPr lang="de-DE" sz="600" dirty="0" err="1">
+                <a:solidFill>
+                  <a:schemeClr val="tx1">
+                    <a:lumMod val="50000"/>
+                    <a:lumOff val="50000"/>
+                  </a:schemeClr>
+                </a:solidFill>
+                <a:ea typeface="Open Sans Semibold" panose="020B0706030804020204" pitchFamily="34" charset="0"/>
+                <a:cs typeface="Open Sans Semibold" panose="020B0706030804020204" pitchFamily="34" charset="0"/>
+              </a:rPr>
+              <a:t>these</a:t>
+            </a:r>
+            <a:r>
+              <a:rPr lang="de-DE" sz="600" dirty="0">
+                <a:solidFill>
+                  <a:schemeClr val="tx1">
+                    <a:lumMod val="50000"/>
+                    <a:lumOff val="50000"/>
+                  </a:schemeClr>
+                </a:solidFill>
+                <a:ea typeface="Open Sans Semibold" panose="020B0706030804020204" pitchFamily="34" charset="0"/>
+                <a:cs typeface="Open Sans Semibold" panose="020B0706030804020204" pitchFamily="34" charset="0"/>
+              </a:rPr>
+              <a:t> </a:t>
+            </a:r>
+            <a:r>
+              <a:rPr lang="de-DE" sz="600" dirty="0" err="1">
+                <a:solidFill>
+                  <a:schemeClr val="tx1">
+                    <a:lumMod val="50000"/>
+                    <a:lumOff val="50000"/>
+                  </a:schemeClr>
+                </a:solidFill>
+                <a:ea typeface="Open Sans Semibold" panose="020B0706030804020204" pitchFamily="34" charset="0"/>
+                <a:cs typeface="Open Sans Semibold" panose="020B0706030804020204" pitchFamily="34" charset="0"/>
+              </a:rPr>
+              <a:t>people</a:t>
+            </a:r>
+            <a:r>
+              <a:rPr lang="de-DE" sz="600" dirty="0">
+                <a:solidFill>
+                  <a:schemeClr val="tx1">
+                    <a:lumMod val="50000"/>
+                    <a:lumOff val="50000"/>
+                  </a:schemeClr>
+                </a:solidFill>
+                <a:ea typeface="Open Sans Semibold" panose="020B0706030804020204" pitchFamily="34" charset="0"/>
+                <a:cs typeface="Open Sans Semibold" panose="020B0706030804020204" pitchFamily="34" charset="0"/>
+              </a:rPr>
+              <a:t> </a:t>
+            </a:r>
+            <a:r>
+              <a:rPr lang="de-DE" sz="600" dirty="0" err="1">
+                <a:solidFill>
+                  <a:schemeClr val="tx1">
+                    <a:lumMod val="50000"/>
+                    <a:lumOff val="50000"/>
+                  </a:schemeClr>
+                </a:solidFill>
+                <a:ea typeface="Open Sans Semibold" panose="020B0706030804020204" pitchFamily="34" charset="0"/>
+                <a:cs typeface="Open Sans Semibold" panose="020B0706030804020204" pitchFamily="34" charset="0"/>
+              </a:rPr>
+              <a:t>already</a:t>
             </a:r>
             <a:r>
               <a:rPr lang="de-DE" sz="600" dirty="0">
@@ -5140,7 +5881,7 @@
         <p:spPr>
           <a:xfrm>
             <a:off x="4952426" y="4927892"/>
-            <a:ext cx="2218877" cy="492443"/>
+            <a:ext cx="2920992" cy="492443"/>
           </a:xfrm>
           <a:prstGeom prst="rect">
             <a:avLst/>
@@ -5189,7 +5930,7 @@
                 <a:ea typeface="Open Sans Semibold" panose="020B0706030804020204" pitchFamily="34" charset="0"/>
                 <a:cs typeface="Open Sans Semibold" panose="020B0706030804020204" pitchFamily="34" charset="0"/>
               </a:rPr>
-              <a:t>What</a:t>
+              <a:t>Which</a:t>
             </a:r>
             <a:r>
               <a:rPr lang="de-DE" sz="600" dirty="0">
@@ -5215,7 +5956,7 @@
                 <a:ea typeface="Open Sans Semibold" panose="020B0706030804020204" pitchFamily="34" charset="0"/>
                 <a:cs typeface="Open Sans Semibold" panose="020B0706030804020204" pitchFamily="34" charset="0"/>
               </a:rPr>
-              <a:t>are</a:t>
+              <a:t>knowledge</a:t>
             </a:r>
             <a:r>
               <a:rPr lang="de-DE" sz="600" dirty="0">
@@ -5241,58 +5982,6 @@
                 <a:ea typeface="Open Sans Semibold" panose="020B0706030804020204" pitchFamily="34" charset="0"/>
                 <a:cs typeface="Open Sans Semibold" panose="020B0706030804020204" pitchFamily="34" charset="0"/>
               </a:rPr>
-              <a:t>the</a:t>
-            </a:r>
-            <a:r>
-              <a:rPr lang="de-DE" sz="600" dirty="0">
-                <a:solidFill>
-                  <a:schemeClr val="tx1">
-                    <a:lumMod val="50000"/>
-                    <a:lumOff val="50000"/>
-                  </a:schemeClr>
-                </a:solidFill>
-                <a:ea typeface="Open Sans Semibold" panose="020B0706030804020204" pitchFamily="34" charset="0"/>
-                <a:cs typeface="Open Sans Semibold" panose="020B0706030804020204" pitchFamily="34" charset="0"/>
-              </a:rPr>
-              <a:t> (digital) </a:t>
-            </a:r>
-            <a:r>
-              <a:rPr lang="de-DE" sz="600" dirty="0" err="1">
-                <a:solidFill>
-                  <a:schemeClr val="tx1">
-                    <a:lumMod val="50000"/>
-                    <a:lumOff val="50000"/>
-                  </a:schemeClr>
-                </a:solidFill>
-                <a:ea typeface="Open Sans Semibold" panose="020B0706030804020204" pitchFamily="34" charset="0"/>
-                <a:cs typeface="Open Sans Semibold" panose="020B0706030804020204" pitchFamily="34" charset="0"/>
-              </a:rPr>
-              <a:t>nowledge</a:t>
-            </a:r>
-            <a:r>
-              <a:rPr lang="de-DE" sz="600" dirty="0">
-                <a:solidFill>
-                  <a:schemeClr val="tx1">
-                    <a:lumMod val="50000"/>
-                    <a:lumOff val="50000"/>
-                  </a:schemeClr>
-                </a:solidFill>
-                <a:ea typeface="Open Sans Semibold" panose="020B0706030804020204" pitchFamily="34" charset="0"/>
-                <a:cs typeface="Open Sans Semibold" panose="020B0706030804020204" pitchFamily="34" charset="0"/>
-              </a:rPr>
-              <a:t> </a:t>
-            </a:r>
-            <a:r>
-              <a:rPr lang="de-DE" sz="600" dirty="0" err="1">
-                <a:solidFill>
-                  <a:schemeClr val="tx1">
-                    <a:lumMod val="50000"/>
-                    <a:lumOff val="50000"/>
-                  </a:schemeClr>
-                </a:solidFill>
-                <a:ea typeface="Open Sans Semibold" panose="020B0706030804020204" pitchFamily="34" charset="0"/>
-                <a:cs typeface="Open Sans Semibold" panose="020B0706030804020204" pitchFamily="34" charset="0"/>
-              </a:rPr>
               <a:t>assets</a:t>
             </a:r>
             <a:r>
@@ -5306,33 +5995,111 @@
                 <a:ea typeface="Open Sans Semibold" panose="020B0706030804020204" pitchFamily="34" charset="0"/>
                 <a:cs typeface="Open Sans Semibold" panose="020B0706030804020204" pitchFamily="34" charset="0"/>
               </a:rPr>
+              <a:t> (</a:t>
+            </a:r>
+            <a:r>
+              <a:rPr lang="de-DE" sz="600" dirty="0" err="1">
+                <a:solidFill>
+                  <a:schemeClr val="tx1">
+                    <a:lumMod val="50000"/>
+                    <a:lumOff val="50000"/>
+                  </a:schemeClr>
+                </a:solidFill>
+                <a:ea typeface="Open Sans Semibold" panose="020B0706030804020204" pitchFamily="34" charset="0"/>
+                <a:cs typeface="Open Sans Semibold" panose="020B0706030804020204" pitchFamily="34" charset="0"/>
+              </a:rPr>
+              <a:t>documents</a:t>
+            </a:r>
+            <a:r>
+              <a:rPr lang="de-DE" sz="600" dirty="0">
+                <a:solidFill>
+                  <a:schemeClr val="tx1">
+                    <a:lumMod val="50000"/>
+                    <a:lumOff val="50000"/>
+                  </a:schemeClr>
+                </a:solidFill>
+                <a:ea typeface="Open Sans Semibold" panose="020B0706030804020204" pitchFamily="34" charset="0"/>
+                <a:cs typeface="Open Sans Semibold" panose="020B0706030804020204" pitchFamily="34" charset="0"/>
+              </a:rPr>
+              <a:t>, </a:t>
+            </a:r>
+            <a:r>
+              <a:rPr lang="de-DE" sz="600" dirty="0" err="1">
+                <a:solidFill>
+                  <a:schemeClr val="tx1">
+                    <a:lumMod val="50000"/>
+                    <a:lumOff val="50000"/>
+                  </a:schemeClr>
+                </a:solidFill>
+                <a:ea typeface="Open Sans Semibold" panose="020B0706030804020204" pitchFamily="34" charset="0"/>
+                <a:cs typeface="Open Sans Semibold" panose="020B0706030804020204" pitchFamily="34" charset="0"/>
+              </a:rPr>
+              <a:t>checklists</a:t>
+            </a:r>
+            <a:r>
+              <a:rPr lang="de-DE" sz="600" dirty="0">
+                <a:solidFill>
+                  <a:schemeClr val="tx1">
+                    <a:lumMod val="50000"/>
+                    <a:lumOff val="50000"/>
+                  </a:schemeClr>
+                </a:solidFill>
+                <a:ea typeface="Open Sans Semibold" panose="020B0706030804020204" pitchFamily="34" charset="0"/>
+                <a:cs typeface="Open Sans Semibold" panose="020B0706030804020204" pitchFamily="34" charset="0"/>
+              </a:rPr>
+              <a:t>, </a:t>
+            </a:r>
+            <a:r>
+              <a:rPr lang="de-DE" sz="600" dirty="0" err="1">
+                <a:solidFill>
+                  <a:schemeClr val="tx1">
+                    <a:lumMod val="50000"/>
+                    <a:lumOff val="50000"/>
+                  </a:schemeClr>
+                </a:solidFill>
+                <a:ea typeface="Open Sans Semibold" panose="020B0706030804020204" pitchFamily="34" charset="0"/>
+                <a:cs typeface="Open Sans Semibold" panose="020B0706030804020204" pitchFamily="34" charset="0"/>
+              </a:rPr>
+              <a:t>videos</a:t>
+            </a:r>
+            <a:r>
+              <a:rPr lang="de-DE" sz="600" dirty="0">
+                <a:solidFill>
+                  <a:schemeClr val="tx1">
+                    <a:lumMod val="50000"/>
+                    <a:lumOff val="50000"/>
+                  </a:schemeClr>
+                </a:solidFill>
+                <a:ea typeface="Open Sans Semibold" panose="020B0706030804020204" pitchFamily="34" charset="0"/>
+                <a:cs typeface="Open Sans Semibold" panose="020B0706030804020204" pitchFamily="34" charset="0"/>
+              </a:rPr>
+              <a:t> etc.) </a:t>
+            </a:r>
+            <a:r>
+              <a:rPr lang="de-DE" sz="600" dirty="0" err="1">
+                <a:solidFill>
+                  <a:schemeClr val="tx1">
+                    <a:lumMod val="50000"/>
+                    <a:lumOff val="50000"/>
+                  </a:schemeClr>
+                </a:solidFill>
+                <a:ea typeface="Open Sans Semibold" panose="020B0706030804020204" pitchFamily="34" charset="0"/>
+                <a:cs typeface="Open Sans Semibold" panose="020B0706030804020204" pitchFamily="34" charset="0"/>
+              </a:rPr>
+              <a:t>can</a:t>
+            </a:r>
+            <a:r>
+              <a:rPr lang="de-DE" sz="600" dirty="0">
+                <a:solidFill>
+                  <a:schemeClr val="tx1">
+                    <a:lumMod val="50000"/>
+                    <a:lumOff val="50000"/>
+                  </a:schemeClr>
+                </a:solidFill>
+                <a:ea typeface="Open Sans Semibold" panose="020B0706030804020204" pitchFamily="34" charset="0"/>
+                <a:cs typeface="Open Sans Semibold" panose="020B0706030804020204" pitchFamily="34" charset="0"/>
+              </a:rPr>
               <a:t> I </a:t>
-            </a:r>
-            <a:r>
-              <a:rPr lang="de-DE" sz="600" dirty="0" err="1">
-                <a:solidFill>
-                  <a:schemeClr val="tx1">
-                    <a:lumMod val="50000"/>
-                    <a:lumOff val="50000"/>
-                  </a:schemeClr>
-                </a:solidFill>
-                <a:ea typeface="Open Sans Semibold" panose="020B0706030804020204" pitchFamily="34" charset="0"/>
-                <a:cs typeface="Open Sans Semibold" panose="020B0706030804020204" pitchFamily="34" charset="0"/>
-              </a:rPr>
-              <a:t>can</a:t>
-            </a:r>
-            <a:r>
-              <a:rPr lang="de-DE" sz="600" dirty="0">
-                <a:solidFill>
-                  <a:schemeClr val="tx1">
-                    <a:lumMod val="50000"/>
-                    <a:lumOff val="50000"/>
-                  </a:schemeClr>
-                </a:solidFill>
-                <a:ea typeface="Open Sans Semibold" panose="020B0706030804020204" pitchFamily="34" charset="0"/>
-                <a:cs typeface="Open Sans Semibold" panose="020B0706030804020204" pitchFamily="34" charset="0"/>
-              </a:rPr>
-              <a:t> </a:t>
             </a:r>
             <a:r>
               <a:rPr lang="de-DE" sz="600" dirty="0" err="1">
@@ -5466,7 +6233,7 @@
         <p:spPr>
           <a:xfrm>
             <a:off x="644711" y="4923099"/>
-            <a:ext cx="1673279" cy="492443"/>
+            <a:ext cx="3414717" cy="492443"/>
           </a:xfrm>
           <a:prstGeom prst="rect">
             <a:avLst/>
@@ -5567,6 +6334,188 @@
                 <a:ea typeface="Open Sans Semibold" panose="020B0706030804020204" pitchFamily="34" charset="0"/>
                 <a:cs typeface="Open Sans Semibold" panose="020B0706030804020204" pitchFamily="34" charset="0"/>
               </a:rPr>
+              <a:t>the</a:t>
+            </a:r>
+            <a:r>
+              <a:rPr lang="de-DE" sz="600" dirty="0">
+                <a:solidFill>
+                  <a:schemeClr val="tx1">
+                    <a:lumMod val="50000"/>
+                    <a:lumOff val="50000"/>
+                  </a:schemeClr>
+                </a:solidFill>
+                <a:ea typeface="Open Sans Semibold" panose="020B0706030804020204" pitchFamily="34" charset="0"/>
+                <a:cs typeface="Open Sans Semibold" panose="020B0706030804020204" pitchFamily="34" charset="0"/>
+              </a:rPr>
+              <a:t> </a:t>
+            </a:r>
+            <a:r>
+              <a:rPr lang="de-DE" sz="600" dirty="0" err="1">
+                <a:solidFill>
+                  <a:schemeClr val="tx1">
+                    <a:lumMod val="50000"/>
+                    <a:lumOff val="50000"/>
+                  </a:schemeClr>
+                </a:solidFill>
+                <a:ea typeface="Open Sans Semibold" panose="020B0706030804020204" pitchFamily="34" charset="0"/>
+                <a:cs typeface="Open Sans Semibold" panose="020B0706030804020204" pitchFamily="34" charset="0"/>
+              </a:rPr>
+              <a:t>fields</a:t>
+            </a:r>
+            <a:r>
+              <a:rPr lang="de-DE" sz="600" dirty="0">
+                <a:solidFill>
+                  <a:schemeClr val="tx1">
+                    <a:lumMod val="50000"/>
+                    <a:lumOff val="50000"/>
+                  </a:schemeClr>
+                </a:solidFill>
+                <a:ea typeface="Open Sans Semibold" panose="020B0706030804020204" pitchFamily="34" charset="0"/>
+                <a:cs typeface="Open Sans Semibold" panose="020B0706030804020204" pitchFamily="34" charset="0"/>
+              </a:rPr>
+              <a:t> </a:t>
+            </a:r>
+            <a:r>
+              <a:rPr lang="de-DE" sz="600" dirty="0" err="1">
+                <a:solidFill>
+                  <a:schemeClr val="tx1">
+                    <a:lumMod val="50000"/>
+                    <a:lumOff val="50000"/>
+                  </a:schemeClr>
+                </a:solidFill>
+                <a:ea typeface="Open Sans Semibold" panose="020B0706030804020204" pitchFamily="34" charset="0"/>
+                <a:cs typeface="Open Sans Semibold" panose="020B0706030804020204" pitchFamily="34" charset="0"/>
+              </a:rPr>
+              <a:t>of</a:t>
+            </a:r>
+            <a:r>
+              <a:rPr lang="de-DE" sz="600" dirty="0">
+                <a:solidFill>
+                  <a:schemeClr val="tx1">
+                    <a:lumMod val="50000"/>
+                    <a:lumOff val="50000"/>
+                  </a:schemeClr>
+                </a:solidFill>
+                <a:ea typeface="Open Sans Semibold" panose="020B0706030804020204" pitchFamily="34" charset="0"/>
+                <a:cs typeface="Open Sans Semibold" panose="020B0706030804020204" pitchFamily="34" charset="0"/>
+              </a:rPr>
+              <a:t> </a:t>
+            </a:r>
+            <a:r>
+              <a:rPr lang="de-DE" sz="600" dirty="0" err="1">
+                <a:solidFill>
+                  <a:schemeClr val="tx1">
+                    <a:lumMod val="50000"/>
+                    <a:lumOff val="50000"/>
+                  </a:schemeClr>
+                </a:solidFill>
+                <a:ea typeface="Open Sans Semibold" panose="020B0706030804020204" pitchFamily="34" charset="0"/>
+                <a:cs typeface="Open Sans Semibold" panose="020B0706030804020204" pitchFamily="34" charset="0"/>
+              </a:rPr>
+              <a:t>knowledge</a:t>
+            </a:r>
+            <a:r>
+              <a:rPr lang="de-DE" sz="600" dirty="0">
+                <a:solidFill>
+                  <a:schemeClr val="tx1">
+                    <a:lumMod val="50000"/>
+                    <a:lumOff val="50000"/>
+                  </a:schemeClr>
+                </a:solidFill>
+                <a:ea typeface="Open Sans Semibold" panose="020B0706030804020204" pitchFamily="34" charset="0"/>
+                <a:cs typeface="Open Sans Semibold" panose="020B0706030804020204" pitchFamily="34" charset="0"/>
+              </a:rPr>
+              <a:t> and </a:t>
+            </a:r>
+            <a:r>
+              <a:rPr lang="de-DE" sz="600" dirty="0" err="1">
+                <a:solidFill>
+                  <a:schemeClr val="tx1">
+                    <a:lumMod val="50000"/>
+                    <a:lumOff val="50000"/>
+                  </a:schemeClr>
+                </a:solidFill>
+                <a:ea typeface="Open Sans Semibold" panose="020B0706030804020204" pitchFamily="34" charset="0"/>
+                <a:cs typeface="Open Sans Semibold" panose="020B0706030804020204" pitchFamily="34" charset="0"/>
+              </a:rPr>
+              <a:t>skills</a:t>
+            </a:r>
+            <a:r>
+              <a:rPr lang="de-DE" sz="600" dirty="0">
+                <a:solidFill>
+                  <a:schemeClr val="tx1">
+                    <a:lumMod val="50000"/>
+                    <a:lumOff val="50000"/>
+                  </a:schemeClr>
+                </a:solidFill>
+                <a:ea typeface="Open Sans Semibold" panose="020B0706030804020204" pitchFamily="34" charset="0"/>
+                <a:cs typeface="Open Sans Semibold" panose="020B0706030804020204" pitchFamily="34" charset="0"/>
+              </a:rPr>
+              <a:t> relevant </a:t>
+            </a:r>
+            <a:r>
+              <a:rPr lang="de-DE" sz="600" dirty="0" err="1">
+                <a:solidFill>
+                  <a:schemeClr val="tx1">
+                    <a:lumMod val="50000"/>
+                    <a:lumOff val="50000"/>
+                  </a:schemeClr>
+                </a:solidFill>
+                <a:ea typeface="Open Sans Semibold" panose="020B0706030804020204" pitchFamily="34" charset="0"/>
+                <a:cs typeface="Open Sans Semibold" panose="020B0706030804020204" pitchFamily="34" charset="0"/>
+              </a:rPr>
+              <a:t>to</a:t>
+            </a:r>
+            <a:r>
+              <a:rPr lang="de-DE" sz="600" dirty="0">
+                <a:solidFill>
+                  <a:schemeClr val="tx1">
+                    <a:lumMod val="50000"/>
+                    <a:lumOff val="50000"/>
+                  </a:schemeClr>
+                </a:solidFill>
+                <a:ea typeface="Open Sans Semibold" panose="020B0706030804020204" pitchFamily="34" charset="0"/>
+                <a:cs typeface="Open Sans Semibold" panose="020B0706030804020204" pitchFamily="34" charset="0"/>
+              </a:rPr>
+              <a:t> </a:t>
+            </a:r>
+            <a:r>
+              <a:rPr lang="de-DE" sz="600" dirty="0" err="1">
+                <a:solidFill>
+                  <a:schemeClr val="tx1">
+                    <a:lumMod val="50000"/>
+                    <a:lumOff val="50000"/>
+                  </a:schemeClr>
+                </a:solidFill>
+                <a:ea typeface="Open Sans Semibold" panose="020B0706030804020204" pitchFamily="34" charset="0"/>
+                <a:cs typeface="Open Sans Semibold" panose="020B0706030804020204" pitchFamily="34" charset="0"/>
+              </a:rPr>
+              <a:t>achieve</a:t>
+            </a:r>
+            <a:r>
+              <a:rPr lang="de-DE" sz="600" dirty="0">
+                <a:solidFill>
+                  <a:schemeClr val="tx1">
+                    <a:lumMod val="50000"/>
+                    <a:lumOff val="50000"/>
+                  </a:schemeClr>
+                </a:solidFill>
+                <a:ea typeface="Open Sans Semibold" panose="020B0706030804020204" pitchFamily="34" charset="0"/>
+                <a:cs typeface="Open Sans Semibold" panose="020B0706030804020204" pitchFamily="34" charset="0"/>
+              </a:rPr>
+              <a:t> </a:t>
+            </a:r>
+            <a:r>
+              <a:rPr lang="de-DE" sz="600" dirty="0" err="1">
+                <a:solidFill>
+                  <a:schemeClr val="tx1">
+                    <a:lumMod val="50000"/>
+                    <a:lumOff val="50000"/>
+                  </a:schemeClr>
+                </a:solidFill>
+                <a:ea typeface="Open Sans Semibold" panose="020B0706030804020204" pitchFamily="34" charset="0"/>
+                <a:cs typeface="Open Sans Semibold" panose="020B0706030804020204" pitchFamily="34" charset="0"/>
+              </a:rPr>
               <a:t>my</a:t>
             </a:r>
             <a:r>
@@ -5593,7 +6542,59 @@
                 <a:ea typeface="Open Sans Semibold" panose="020B0706030804020204" pitchFamily="34" charset="0"/>
                 <a:cs typeface="Open Sans Semibold" panose="020B0706030804020204" pitchFamily="34" charset="0"/>
               </a:rPr>
-              <a:t>areas</a:t>
+              <a:t>objectives</a:t>
+            </a:r>
+            <a:r>
+              <a:rPr lang="de-DE" sz="600" dirty="0">
+                <a:solidFill>
+                  <a:schemeClr val="tx1">
+                    <a:lumMod val="50000"/>
+                    <a:lumOff val="50000"/>
+                  </a:schemeClr>
+                </a:solidFill>
+                <a:ea typeface="Open Sans Semibold" panose="020B0706030804020204" pitchFamily="34" charset="0"/>
+                <a:cs typeface="Open Sans Semibold" panose="020B0706030804020204" pitchFamily="34" charset="0"/>
+              </a:rPr>
+              <a:t>? </a:t>
+            </a:r>
+            <a:r>
+              <a:rPr lang="de-DE" sz="600" dirty="0" err="1">
+                <a:solidFill>
+                  <a:schemeClr val="tx1">
+                    <a:lumMod val="50000"/>
+                    <a:lumOff val="50000"/>
+                  </a:schemeClr>
+                </a:solidFill>
+                <a:ea typeface="Open Sans Semibold" panose="020B0706030804020204" pitchFamily="34" charset="0"/>
+                <a:cs typeface="Open Sans Semibold" panose="020B0706030804020204" pitchFamily="34" charset="0"/>
+              </a:rPr>
+              <a:t>What</a:t>
+            </a:r>
+            <a:r>
+              <a:rPr lang="de-DE" sz="600" dirty="0">
+                <a:solidFill>
+                  <a:schemeClr val="tx1">
+                    <a:lumMod val="50000"/>
+                    <a:lumOff val="50000"/>
+                  </a:schemeClr>
+                </a:solidFill>
+                <a:ea typeface="Open Sans Semibold" panose="020B0706030804020204" pitchFamily="34" charset="0"/>
+                <a:cs typeface="Open Sans Semibold" panose="020B0706030804020204" pitchFamily="34" charset="0"/>
+              </a:rPr>
+              <a:t> do I </a:t>
+            </a:r>
+            <a:r>
+              <a:rPr lang="de-DE" sz="600" dirty="0" err="1">
+                <a:solidFill>
+                  <a:schemeClr val="tx1">
+                    <a:lumMod val="50000"/>
+                    <a:lumOff val="50000"/>
+                  </a:schemeClr>
+                </a:solidFill>
+                <a:ea typeface="Open Sans Semibold" panose="020B0706030804020204" pitchFamily="34" charset="0"/>
+                <a:cs typeface="Open Sans Semibold" panose="020B0706030804020204" pitchFamily="34" charset="0"/>
+              </a:rPr>
+              <a:t>have</a:t>
             </a:r>
             <a:r>
               <a:rPr lang="de-DE" sz="600" dirty="0">
@@ -5619,7 +6620,7 @@
                 <a:ea typeface="Open Sans Semibold" panose="020B0706030804020204" pitchFamily="34" charset="0"/>
                 <a:cs typeface="Open Sans Semibold" panose="020B0706030804020204" pitchFamily="34" charset="0"/>
               </a:rPr>
-              <a:t>of</a:t>
+              <a:t>to</a:t>
             </a:r>
             <a:r>
               <a:rPr lang="de-DE" sz="600" dirty="0">
@@ -5645,7 +6646,7 @@
                 <a:ea typeface="Open Sans Semibold" panose="020B0706030804020204" pitchFamily="34" charset="0"/>
                 <a:cs typeface="Open Sans Semibold" panose="020B0706030804020204" pitchFamily="34" charset="0"/>
               </a:rPr>
-              <a:t>expertise</a:t>
+              <a:t>learn</a:t>
             </a:r>
             <a:r>
               <a:rPr lang="de-DE" sz="600" dirty="0">
@@ -5687,8 +6688,8 @@
         </p:nvSpPr>
         <p:spPr>
           <a:xfrm>
-            <a:off x="6526697" y="259812"/>
-            <a:ext cx="1905016" cy="387017"/>
+            <a:off x="4774905" y="259812"/>
+            <a:ext cx="3656808" cy="387017"/>
           </a:xfrm>
           <a:prstGeom prst="rect">
             <a:avLst/>
@@ -5735,6 +6736,53 @@
                 </a:solidFill>
               </a:rPr>
               <a:t>Purpose:</a:t>
+            </a:r>
+            <a:br>
+              <a:rPr lang="de-DE" sz="1000" dirty="0">
+                <a:solidFill>
+                  <a:schemeClr val="tx1"/>
+                </a:solidFill>
+              </a:rPr>
+            </a:br>
+            <a:r>
+              <a:rPr lang="de-DE" sz="1000" dirty="0">
+                <a:solidFill>
+                  <a:schemeClr val="tx1"/>
+                </a:solidFill>
+              </a:rPr>
+              <a:t>(</a:t>
+            </a:r>
+            <a:r>
+              <a:rPr lang="de-DE" sz="1000" dirty="0" err="1">
+                <a:solidFill>
+                  <a:schemeClr val="tx1"/>
+                </a:solidFill>
+              </a:rPr>
+              <a:t>the</a:t>
+            </a:r>
+            <a:r>
+              <a:rPr lang="de-DE" sz="1000" dirty="0">
+                <a:solidFill>
+                  <a:schemeClr val="tx1"/>
+                </a:solidFill>
+              </a:rPr>
+              <a:t> „</a:t>
+            </a:r>
+            <a:r>
+              <a:rPr lang="de-DE" sz="1000" dirty="0" err="1">
+                <a:solidFill>
+                  <a:schemeClr val="tx1"/>
+                </a:solidFill>
+              </a:rPr>
+              <a:t>why</a:t>
+            </a:r>
+            <a:r>
+              <a:rPr lang="de-DE" sz="1000" dirty="0">
+                <a:solidFill>
+                  <a:schemeClr val="tx1"/>
+                </a:solidFill>
+              </a:rPr>
+              <a:t>“)</a:t>
             </a:r>
           </a:p>
         </p:txBody>
@@ -6570,7 +7618,7 @@
         <p:spPr>
           <a:xfrm>
             <a:off x="3626888" y="250637"/>
-            <a:ext cx="2660728" cy="369332"/>
+            <a:ext cx="864019" cy="369332"/>
           </a:xfrm>
           <a:prstGeom prst="rect">
             <a:avLst/>
@@ -6589,113 +7637,17 @@
                 <a:ea typeface="Open Sans Semibold" panose="020B0706030804020204" pitchFamily="34" charset="0"/>
                 <a:cs typeface="Open Sans Semibold" panose="020B0706030804020204" pitchFamily="34" charset="0"/>
               </a:rPr>
-              <a:t>Working </a:t>
-            </a:r>
-            <a:r>
-              <a:rPr lang="de-DE" sz="1200" dirty="0" err="1">
-                <a:latin typeface="+mj-lt"/>
-                <a:ea typeface="Open Sans Semibold" panose="020B0706030804020204" pitchFamily="34" charset="0"/>
-                <a:cs typeface="Open Sans Semibold" panose="020B0706030804020204" pitchFamily="34" charset="0"/>
-              </a:rPr>
-              <a:t>is</a:t>
-            </a:r>
+              <a:t>Working Out</a:t>
+            </a:r>
+          </a:p>
+          <a:p>
             <a:r>
               <a:rPr lang="de-DE" sz="1200" dirty="0">
                 <a:latin typeface="+mj-lt"/>
                 <a:ea typeface="Open Sans Semibold" panose="020B0706030804020204" pitchFamily="34" charset="0"/>
                 <a:cs typeface="Open Sans Semibold" panose="020B0706030804020204" pitchFamily="34" charset="0"/>
               </a:rPr>
-              <a:t> Learning &amp; Learning </a:t>
-            </a:r>
-            <a:r>
-              <a:rPr lang="de-DE" sz="1200" dirty="0" err="1">
-                <a:latin typeface="+mj-lt"/>
-                <a:ea typeface="Open Sans Semibold" panose="020B0706030804020204" pitchFamily="34" charset="0"/>
-                <a:cs typeface="Open Sans Semibold" panose="020B0706030804020204" pitchFamily="34" charset="0"/>
-              </a:rPr>
-              <a:t>is</a:t>
-            </a:r>
-            <a:r>
-              <a:rPr lang="de-DE" sz="1200" dirty="0">
-                <a:latin typeface="+mj-lt"/>
-                <a:ea typeface="Open Sans Semibold" panose="020B0706030804020204" pitchFamily="34" charset="0"/>
-                <a:cs typeface="Open Sans Semibold" panose="020B0706030804020204" pitchFamily="34" charset="0"/>
-              </a:rPr>
-              <a:t> Working</a:t>
-            </a:r>
-          </a:p>
-          <a:p>
-            <a:r>
-              <a:rPr lang="de-DE" sz="1200" dirty="0">
-                <a:latin typeface="+mj-lt"/>
-                <a:ea typeface="Open Sans Semibold" panose="020B0706030804020204" pitchFamily="34" charset="0"/>
-                <a:cs typeface="Open Sans Semibold" panose="020B0706030804020204" pitchFamily="34" charset="0"/>
-              </a:rPr>
-              <a:t>So </a:t>
-            </a:r>
-            <a:r>
-              <a:rPr lang="de-DE" sz="1200" dirty="0" err="1">
-                <a:latin typeface="+mj-lt"/>
-                <a:ea typeface="Open Sans Semibold" panose="020B0706030804020204" pitchFamily="34" charset="0"/>
-                <a:cs typeface="Open Sans Semibold" panose="020B0706030804020204" pitchFamily="34" charset="0"/>
-              </a:rPr>
-              <a:t>start</a:t>
-            </a:r>
-            <a:r>
-              <a:rPr lang="de-DE" sz="1200" dirty="0">
-                <a:latin typeface="+mj-lt"/>
-                <a:ea typeface="Open Sans Semibold" panose="020B0706030804020204" pitchFamily="34" charset="0"/>
-                <a:cs typeface="Open Sans Semibold" panose="020B0706030804020204" pitchFamily="34" charset="0"/>
-              </a:rPr>
-              <a:t> </a:t>
-            </a:r>
-            <a:r>
-              <a:rPr lang="de-DE" sz="1200" dirty="0" err="1">
-                <a:latin typeface="+mj-lt"/>
-                <a:ea typeface="Open Sans Semibold" panose="020B0706030804020204" pitchFamily="34" charset="0"/>
-                <a:cs typeface="Open Sans Semibold" panose="020B0706030804020204" pitchFamily="34" charset="0"/>
-              </a:rPr>
-              <a:t>to</a:t>
-            </a:r>
-            <a:r>
-              <a:rPr lang="de-DE" sz="1200" dirty="0">
-                <a:latin typeface="+mj-lt"/>
-                <a:ea typeface="Open Sans Semibold" panose="020B0706030804020204" pitchFamily="34" charset="0"/>
-                <a:cs typeface="Open Sans Semibold" panose="020B0706030804020204" pitchFamily="34" charset="0"/>
-              </a:rPr>
-              <a:t> Work &amp; </a:t>
-            </a:r>
-            <a:r>
-              <a:rPr lang="de-DE" sz="1200" dirty="0" err="1">
-                <a:latin typeface="+mj-lt"/>
-                <a:ea typeface="Open Sans Semibold" panose="020B0706030804020204" pitchFamily="34" charset="0"/>
-                <a:cs typeface="Open Sans Semibold" panose="020B0706030804020204" pitchFamily="34" charset="0"/>
-              </a:rPr>
-              <a:t>Learn</a:t>
-            </a:r>
-            <a:r>
-              <a:rPr lang="de-DE" sz="1200" dirty="0">
-                <a:latin typeface="+mj-lt"/>
-                <a:ea typeface="Open Sans Semibold" panose="020B0706030804020204" pitchFamily="34" charset="0"/>
-                <a:cs typeface="Open Sans Semibold" panose="020B0706030804020204" pitchFamily="34" charset="0"/>
-              </a:rPr>
-              <a:t> Out Loud </a:t>
-            </a:r>
-            <a:r>
-              <a:rPr lang="de-DE" sz="1200" dirty="0" err="1">
-                <a:latin typeface="+mj-lt"/>
-                <a:ea typeface="Open Sans Semibold" panose="020B0706030804020204" pitchFamily="34" charset="0"/>
-                <a:cs typeface="Open Sans Semibold" panose="020B0706030804020204" pitchFamily="34" charset="0"/>
-              </a:rPr>
-              <a:t>now</a:t>
-            </a:r>
-            <a:r>
-              <a:rPr lang="de-DE" sz="1200" dirty="0">
-                <a:latin typeface="+mj-lt"/>
-                <a:ea typeface="Open Sans Semibold" panose="020B0706030804020204" pitchFamily="34" charset="0"/>
-                <a:cs typeface="Open Sans Semibold" panose="020B0706030804020204" pitchFamily="34" charset="0"/>
-              </a:rPr>
-              <a:t>!</a:t>
+              <a:t>Open &amp; Loud!</a:t>
             </a:r>
           </a:p>
         </p:txBody>
@@ -6841,13 +7793,13 @@
               <a:rPr lang="de-DE" sz="800" b="1" i="1" dirty="0">
                 <a:latin typeface="Bodoni MT" panose="02070603080606020203" pitchFamily="18" charset="0"/>
               </a:rPr>
-              <a:t>The </a:t>
+              <a:t>The lernOS Canvas </a:t>
             </a:r>
             <a:r>
               <a:rPr lang="de-DE" sz="800" b="1" i="1" dirty="0" err="1">
                 <a:latin typeface="Bodoni MT" panose="02070603080606020203" pitchFamily="18" charset="0"/>
               </a:rPr>
-              <a:t>lernOS</a:t>
+              <a:t>is</a:t>
             </a:r>
             <a:r>
               <a:rPr lang="de-DE" sz="800" b="1" i="1" dirty="0">
@@ -6859,7 +7811,7 @@
               <a:rPr lang="de-DE" sz="800" b="1" i="1" dirty="0" err="1">
                 <a:latin typeface="Bodoni MT" panose="02070603080606020203" pitchFamily="18" charset="0"/>
               </a:rPr>
-              <a:t>canvas</a:t>
+              <a:t>part</a:t>
             </a:r>
             <a:r>
               <a:rPr lang="de-DE" sz="800" b="1" i="1" dirty="0">
@@ -6871,61 +7823,25 @@
               <a:rPr lang="de-DE" sz="800" b="1" i="1" dirty="0" err="1">
                 <a:latin typeface="Bodoni MT" panose="02070603080606020203" pitchFamily="18" charset="0"/>
               </a:rPr>
-              <a:t>is</a:t>
+              <a:t>of</a:t>
             </a:r>
             <a:r>
               <a:rPr lang="de-DE" sz="800" b="1" i="1" dirty="0">
                 <a:latin typeface="Bodoni MT" panose="02070603080606020203" pitchFamily="18" charset="0"/>
               </a:rPr>
-              <a:t> </a:t>
+              <a:t> lernOS, </a:t>
             </a:r>
             <a:r>
               <a:rPr lang="de-DE" sz="800" b="1" i="1" dirty="0" err="1">
                 <a:latin typeface="Bodoni MT" panose="02070603080606020203" pitchFamily="18" charset="0"/>
               </a:rPr>
-              <a:t>part</a:t>
+              <a:t>the</a:t>
             </a:r>
             <a:r>
               <a:rPr lang="de-DE" sz="800" b="1" i="1" dirty="0">
                 <a:latin typeface="Bodoni MT" panose="02070603080606020203" pitchFamily="18" charset="0"/>
               </a:rPr>
-              <a:t> </a:t>
-            </a:r>
-            <a:r>
-              <a:rPr lang="de-DE" sz="800" b="1" i="1" dirty="0" err="1">
-                <a:latin typeface="Bodoni MT" panose="02070603080606020203" pitchFamily="18" charset="0"/>
-              </a:rPr>
-              <a:t>of</a:t>
-            </a:r>
-            <a:r>
-              <a:rPr lang="de-DE" sz="800" b="1" i="1" dirty="0">
-                <a:latin typeface="Bodoni MT" panose="02070603080606020203" pitchFamily="18" charset="0"/>
-              </a:rPr>
-              <a:t> </a:t>
-            </a:r>
-            <a:r>
-              <a:rPr lang="de-DE" sz="800" b="1" i="1" dirty="0" err="1">
-                <a:latin typeface="Bodoni MT" panose="02070603080606020203" pitchFamily="18" charset="0"/>
-              </a:rPr>
-              <a:t>the</a:t>
-            </a:r>
-            <a:r>
-              <a:rPr lang="de-DE" sz="800" b="1" i="1" dirty="0">
-                <a:latin typeface="Bodoni MT" panose="02070603080606020203" pitchFamily="18" charset="0"/>
-              </a:rPr>
-              <a:t> </a:t>
-            </a:r>
-            <a:r>
-              <a:rPr lang="de-DE" sz="800" b="1" i="1" dirty="0" err="1">
-                <a:latin typeface="Bodoni MT" panose="02070603080606020203" pitchFamily="18" charset="0"/>
-              </a:rPr>
-              <a:t>lernOS</a:t>
-            </a:r>
-            <a:r>
-              <a:rPr lang="de-DE" sz="800" b="1" i="1" dirty="0">
-                <a:latin typeface="Bodoni MT" panose="02070603080606020203" pitchFamily="18" charset="0"/>
-              </a:rPr>
-              <a:t>, an Operating System </a:t>
+              <a:t> Operating System </a:t>
             </a:r>
             <a:r>
               <a:rPr lang="de-DE" sz="800" b="1" i="1" dirty="0" err="1">

</xml_diff>